<commit_message>
Assignment 3 with report and ppt
</commit_message>
<xml_diff>
--- a/Assignment 3/Report.pptx
+++ b/Assignment 3/Report.pptx
@@ -11,15 +11,13 @@
     <p:sldId id="259" r:id="rId5"/>
     <p:sldId id="260" r:id="rId6"/>
     <p:sldId id="261" r:id="rId7"/>
-    <p:sldId id="268" r:id="rId8"/>
-    <p:sldId id="262" r:id="rId9"/>
-    <p:sldId id="269" r:id="rId10"/>
-    <p:sldId id="263" r:id="rId11"/>
-    <p:sldId id="270" r:id="rId12"/>
-    <p:sldId id="264" r:id="rId13"/>
-    <p:sldId id="265" r:id="rId14"/>
-    <p:sldId id="266" r:id="rId15"/>
-    <p:sldId id="267" r:id="rId16"/>
+    <p:sldId id="262" r:id="rId8"/>
+    <p:sldId id="263" r:id="rId9"/>
+    <p:sldId id="267" r:id="rId10"/>
+    <p:sldId id="269" r:id="rId11"/>
+    <p:sldId id="264" r:id="rId12"/>
+    <p:sldId id="265" r:id="rId13"/>
+    <p:sldId id="266" r:id="rId14"/>
   </p:sldIdLst>
   <p:sldSz cx="12192000" cy="6858000"/>
   <p:notesSz cx="6858000" cy="9144000"/>
@@ -118,6 +116,11 @@
       </a:defRPr>
     </a:lvl9pPr>
   </p:defaultTextStyle>
+  <p:extLst>
+    <p:ext uri="{EFAFB233-063F-42B5-8137-9DF3F51BA10A}">
+      <p15:sldGuideLst xmlns:p15="http://schemas.microsoft.com/office/powerpoint/2012/main"/>
+    </p:ext>
+  </p:extLst>
 </p:presentation>
 </file>
 
@@ -143,7 +146,7 @@
           <p:cNvPr id="2" name="Title 1">
             <a:extLst>
               <a:ext uri="{FF2B5EF4-FFF2-40B4-BE49-F238E27FC236}">
-                <a16:creationId xmlns:a16="http://schemas.microsoft.com/office/drawing/2014/main" id="{7330B80E-B085-B1FA-4817-24F08EBB528B}"/>
+                <a16:creationId xmlns:a16="http://schemas.microsoft.com/office/drawing/2014/main" id="{09CBE801-F93E-0F60-FA5D-E560992D4011}"/>
               </a:ext>
             </a:extLst>
           </p:cNvPr>
@@ -180,7 +183,7 @@
           <p:cNvPr id="3" name="Subtitle 2">
             <a:extLst>
               <a:ext uri="{FF2B5EF4-FFF2-40B4-BE49-F238E27FC236}">
-                <a16:creationId xmlns:a16="http://schemas.microsoft.com/office/drawing/2014/main" id="{9F8FD5AF-0C13-1024-B16D-35832689C3AD}"/>
+                <a16:creationId xmlns:a16="http://schemas.microsoft.com/office/drawing/2014/main" id="{639B22AF-B221-EBA1-F69D-ED3A0DEC626B}"/>
               </a:ext>
             </a:extLst>
           </p:cNvPr>
@@ -250,7 +253,7 @@
           <p:cNvPr id="4" name="Date Placeholder 3">
             <a:extLst>
               <a:ext uri="{FF2B5EF4-FFF2-40B4-BE49-F238E27FC236}">
-                <a16:creationId xmlns:a16="http://schemas.microsoft.com/office/drawing/2014/main" id="{C4775F76-1EB2-D324-A9DB-D21376311DF1}"/>
+                <a16:creationId xmlns:a16="http://schemas.microsoft.com/office/drawing/2014/main" id="{130FF2B9-D64F-B89B-FCF3-A424334E8D25}"/>
               </a:ext>
             </a:extLst>
           </p:cNvPr>
@@ -266,9 +269,9 @@
           <a:bodyPr/>
           <a:lstStyle/>
           <a:p>
-            <a:fld id="{4A180DA4-5881-4B27-B989-F386607230A2}" type="datetimeFigureOut">
+            <a:fld id="{1BBDA783-43D3-4D55-9ECC-BB372A0106B9}" type="datetimeFigureOut">
               <a:rPr lang="en-US" smtClean="0"/>
-              <a:t>12/3/2024</a:t>
+              <a:t>12/9/2024</a:t>
             </a:fld>
             <a:endParaRPr lang="en-US"/>
           </a:p>
@@ -279,7 +282,7 @@
           <p:cNvPr id="5" name="Footer Placeholder 4">
             <a:extLst>
               <a:ext uri="{FF2B5EF4-FFF2-40B4-BE49-F238E27FC236}">
-                <a16:creationId xmlns:a16="http://schemas.microsoft.com/office/drawing/2014/main" id="{346CE27E-6699-C37D-CB78-290D11116907}"/>
+                <a16:creationId xmlns:a16="http://schemas.microsoft.com/office/drawing/2014/main" id="{47113219-4331-3954-7444-0D31B6EE98E6}"/>
               </a:ext>
             </a:extLst>
           </p:cNvPr>
@@ -304,7 +307,7 @@
           <p:cNvPr id="6" name="Slide Number Placeholder 5">
             <a:extLst>
               <a:ext uri="{FF2B5EF4-FFF2-40B4-BE49-F238E27FC236}">
-                <a16:creationId xmlns:a16="http://schemas.microsoft.com/office/drawing/2014/main" id="{F0410642-A30A-59FB-1651-8CDB7989F6C2}"/>
+                <a16:creationId xmlns:a16="http://schemas.microsoft.com/office/drawing/2014/main" id="{662F22BE-F751-14D7-50AA-2140D65FCB46}"/>
               </a:ext>
             </a:extLst>
           </p:cNvPr>
@@ -320,7 +323,7 @@
           <a:bodyPr/>
           <a:lstStyle/>
           <a:p>
-            <a:fld id="{EF0A9E9B-556D-45E0-98C4-7F21B912A81C}" type="slidenum">
+            <a:fld id="{7EA376F5-AF5D-40CB-873E-8425B2D34723}" type="slidenum">
               <a:rPr lang="en-US" smtClean="0"/>
               <a:t>‹#›</a:t>
             </a:fld>
@@ -331,7 +334,7 @@
     </p:spTree>
     <p:extLst>
       <p:ext uri="{BB962C8B-B14F-4D97-AF65-F5344CB8AC3E}">
-        <p14:creationId xmlns:p14="http://schemas.microsoft.com/office/powerpoint/2010/main" val="3040909263"/>
+        <p14:creationId xmlns:p14="http://schemas.microsoft.com/office/powerpoint/2010/main" val="2514499508"/>
       </p:ext>
     </p:extLst>
   </p:cSld>
@@ -363,7 +366,7 @@
           <p:cNvPr id="2" name="Title 1">
             <a:extLst>
               <a:ext uri="{FF2B5EF4-FFF2-40B4-BE49-F238E27FC236}">
-                <a16:creationId xmlns:a16="http://schemas.microsoft.com/office/drawing/2014/main" id="{68910352-2698-820D-99F6-851D49D35469}"/>
+                <a16:creationId xmlns:a16="http://schemas.microsoft.com/office/drawing/2014/main" id="{55E03F37-8670-9809-3D45-77DD6330D075}"/>
               </a:ext>
             </a:extLst>
           </p:cNvPr>
@@ -391,7 +394,7 @@
           <p:cNvPr id="3" name="Vertical Text Placeholder 2">
             <a:extLst>
               <a:ext uri="{FF2B5EF4-FFF2-40B4-BE49-F238E27FC236}">
-                <a16:creationId xmlns:a16="http://schemas.microsoft.com/office/drawing/2014/main" id="{1D244809-AFE8-B59B-B05A-9BCA0711F3AB}"/>
+                <a16:creationId xmlns:a16="http://schemas.microsoft.com/office/drawing/2014/main" id="{0EAEA010-DE17-14F7-451D-9AB68B4D9EFA}"/>
               </a:ext>
             </a:extLst>
           </p:cNvPr>
@@ -448,7 +451,7 @@
           <p:cNvPr id="4" name="Date Placeholder 3">
             <a:extLst>
               <a:ext uri="{FF2B5EF4-FFF2-40B4-BE49-F238E27FC236}">
-                <a16:creationId xmlns:a16="http://schemas.microsoft.com/office/drawing/2014/main" id="{FBFCCC13-6962-C7D8-D434-2EDC522D870A}"/>
+                <a16:creationId xmlns:a16="http://schemas.microsoft.com/office/drawing/2014/main" id="{AC72EDDA-397A-DEBD-1CA1-05EC467F50EE}"/>
               </a:ext>
             </a:extLst>
           </p:cNvPr>
@@ -464,9 +467,9 @@
           <a:bodyPr/>
           <a:lstStyle/>
           <a:p>
-            <a:fld id="{4A180DA4-5881-4B27-B989-F386607230A2}" type="datetimeFigureOut">
+            <a:fld id="{1BBDA783-43D3-4D55-9ECC-BB372A0106B9}" type="datetimeFigureOut">
               <a:rPr lang="en-US" smtClean="0"/>
-              <a:t>12/3/2024</a:t>
+              <a:t>12/9/2024</a:t>
             </a:fld>
             <a:endParaRPr lang="en-US"/>
           </a:p>
@@ -477,7 +480,7 @@
           <p:cNvPr id="5" name="Footer Placeholder 4">
             <a:extLst>
               <a:ext uri="{FF2B5EF4-FFF2-40B4-BE49-F238E27FC236}">
-                <a16:creationId xmlns:a16="http://schemas.microsoft.com/office/drawing/2014/main" id="{ACEAC6DC-CE0B-EBD5-6329-F3BBDD5BD57F}"/>
+                <a16:creationId xmlns:a16="http://schemas.microsoft.com/office/drawing/2014/main" id="{D69CB9E9-416B-ECA5-DA95-F56AA5B92595}"/>
               </a:ext>
             </a:extLst>
           </p:cNvPr>
@@ -502,7 +505,7 @@
           <p:cNvPr id="6" name="Slide Number Placeholder 5">
             <a:extLst>
               <a:ext uri="{FF2B5EF4-FFF2-40B4-BE49-F238E27FC236}">
-                <a16:creationId xmlns:a16="http://schemas.microsoft.com/office/drawing/2014/main" id="{D4696A5F-80A4-DBF2-F58B-10AAD980DF94}"/>
+                <a16:creationId xmlns:a16="http://schemas.microsoft.com/office/drawing/2014/main" id="{6C0886DD-2C38-524C-B9B2-425A6DF9035A}"/>
               </a:ext>
             </a:extLst>
           </p:cNvPr>
@@ -518,7 +521,7 @@
           <a:bodyPr/>
           <a:lstStyle/>
           <a:p>
-            <a:fld id="{EF0A9E9B-556D-45E0-98C4-7F21B912A81C}" type="slidenum">
+            <a:fld id="{7EA376F5-AF5D-40CB-873E-8425B2D34723}" type="slidenum">
               <a:rPr lang="en-US" smtClean="0"/>
               <a:t>‹#›</a:t>
             </a:fld>
@@ -529,7 +532,7 @@
     </p:spTree>
     <p:extLst>
       <p:ext uri="{BB962C8B-B14F-4D97-AF65-F5344CB8AC3E}">
-        <p14:creationId xmlns:p14="http://schemas.microsoft.com/office/powerpoint/2010/main" val="3568824110"/>
+        <p14:creationId xmlns:p14="http://schemas.microsoft.com/office/powerpoint/2010/main" val="1357193616"/>
       </p:ext>
     </p:extLst>
   </p:cSld>
@@ -561,7 +564,7 @@
           <p:cNvPr id="2" name="Vertical Title 1">
             <a:extLst>
               <a:ext uri="{FF2B5EF4-FFF2-40B4-BE49-F238E27FC236}">
-                <a16:creationId xmlns:a16="http://schemas.microsoft.com/office/drawing/2014/main" id="{88329019-C437-0BF8-782C-8DDD193A8B26}"/>
+                <a16:creationId xmlns:a16="http://schemas.microsoft.com/office/drawing/2014/main" id="{39038BC9-3A70-AA93-172D-EB1397E43920}"/>
               </a:ext>
             </a:extLst>
           </p:cNvPr>
@@ -594,7 +597,7 @@
           <p:cNvPr id="3" name="Vertical Text Placeholder 2">
             <a:extLst>
               <a:ext uri="{FF2B5EF4-FFF2-40B4-BE49-F238E27FC236}">
-                <a16:creationId xmlns:a16="http://schemas.microsoft.com/office/drawing/2014/main" id="{6F8FC53F-0BCC-B872-0499-A0664D654E94}"/>
+                <a16:creationId xmlns:a16="http://schemas.microsoft.com/office/drawing/2014/main" id="{17C92A11-5B22-B5F5-0506-CFE1840B5698}"/>
               </a:ext>
             </a:extLst>
           </p:cNvPr>
@@ -656,7 +659,7 @@
           <p:cNvPr id="4" name="Date Placeholder 3">
             <a:extLst>
               <a:ext uri="{FF2B5EF4-FFF2-40B4-BE49-F238E27FC236}">
-                <a16:creationId xmlns:a16="http://schemas.microsoft.com/office/drawing/2014/main" id="{F8CC1C52-0370-BA9C-A3DC-85AA40656AD5}"/>
+                <a16:creationId xmlns:a16="http://schemas.microsoft.com/office/drawing/2014/main" id="{CAF2EFDD-0424-07FB-6799-9412E7A51427}"/>
               </a:ext>
             </a:extLst>
           </p:cNvPr>
@@ -672,9 +675,9 @@
           <a:bodyPr/>
           <a:lstStyle/>
           <a:p>
-            <a:fld id="{4A180DA4-5881-4B27-B989-F386607230A2}" type="datetimeFigureOut">
+            <a:fld id="{1BBDA783-43D3-4D55-9ECC-BB372A0106B9}" type="datetimeFigureOut">
               <a:rPr lang="en-US" smtClean="0"/>
-              <a:t>12/3/2024</a:t>
+              <a:t>12/9/2024</a:t>
             </a:fld>
             <a:endParaRPr lang="en-US"/>
           </a:p>
@@ -685,7 +688,7 @@
           <p:cNvPr id="5" name="Footer Placeholder 4">
             <a:extLst>
               <a:ext uri="{FF2B5EF4-FFF2-40B4-BE49-F238E27FC236}">
-                <a16:creationId xmlns:a16="http://schemas.microsoft.com/office/drawing/2014/main" id="{7F239E5A-8E0E-D74D-06F1-40C4CB5C87B6}"/>
+                <a16:creationId xmlns:a16="http://schemas.microsoft.com/office/drawing/2014/main" id="{D452B9E4-83C7-A6AD-A661-434634532110}"/>
               </a:ext>
             </a:extLst>
           </p:cNvPr>
@@ -710,7 +713,7 @@
           <p:cNvPr id="6" name="Slide Number Placeholder 5">
             <a:extLst>
               <a:ext uri="{FF2B5EF4-FFF2-40B4-BE49-F238E27FC236}">
-                <a16:creationId xmlns:a16="http://schemas.microsoft.com/office/drawing/2014/main" id="{5EC7A56C-2C8C-8607-9DE1-553673137C38}"/>
+                <a16:creationId xmlns:a16="http://schemas.microsoft.com/office/drawing/2014/main" id="{54AE42C7-2F2D-E6DC-B1CB-99ADFFCD4150}"/>
               </a:ext>
             </a:extLst>
           </p:cNvPr>
@@ -726,7 +729,7 @@
           <a:bodyPr/>
           <a:lstStyle/>
           <a:p>
-            <a:fld id="{EF0A9E9B-556D-45E0-98C4-7F21B912A81C}" type="slidenum">
+            <a:fld id="{7EA376F5-AF5D-40CB-873E-8425B2D34723}" type="slidenum">
               <a:rPr lang="en-US" smtClean="0"/>
               <a:t>‹#›</a:t>
             </a:fld>
@@ -737,7 +740,7 @@
     </p:spTree>
     <p:extLst>
       <p:ext uri="{BB962C8B-B14F-4D97-AF65-F5344CB8AC3E}">
-        <p14:creationId xmlns:p14="http://schemas.microsoft.com/office/powerpoint/2010/main" val="3598920239"/>
+        <p14:creationId xmlns:p14="http://schemas.microsoft.com/office/powerpoint/2010/main" val="2264168191"/>
       </p:ext>
     </p:extLst>
   </p:cSld>
@@ -769,7 +772,7 @@
           <p:cNvPr id="2" name="Title 1">
             <a:extLst>
               <a:ext uri="{FF2B5EF4-FFF2-40B4-BE49-F238E27FC236}">
-                <a16:creationId xmlns:a16="http://schemas.microsoft.com/office/drawing/2014/main" id="{2FF60047-914A-FACC-EF1D-D372B1EB2F91}"/>
+                <a16:creationId xmlns:a16="http://schemas.microsoft.com/office/drawing/2014/main" id="{089B39B3-18EE-F371-200E-6C6762184148}"/>
               </a:ext>
             </a:extLst>
           </p:cNvPr>
@@ -797,7 +800,7 @@
           <p:cNvPr id="3" name="Text Placeholder 2">
             <a:extLst>
               <a:ext uri="{FF2B5EF4-FFF2-40B4-BE49-F238E27FC236}">
-                <a16:creationId xmlns:a16="http://schemas.microsoft.com/office/drawing/2014/main" id="{A2BDF172-B385-9E1E-6445-706E4DAAFBD2}"/>
+                <a16:creationId xmlns:a16="http://schemas.microsoft.com/office/drawing/2014/main" id="{A77774DB-CE75-07B2-CEB0-F9BB5C5A7548}"/>
               </a:ext>
             </a:extLst>
           </p:cNvPr>
@@ -854,7 +857,7 @@
           <p:cNvPr id="4" name="Date Placeholder 3">
             <a:extLst>
               <a:ext uri="{FF2B5EF4-FFF2-40B4-BE49-F238E27FC236}">
-                <a16:creationId xmlns:a16="http://schemas.microsoft.com/office/drawing/2014/main" id="{DC0AFD9C-2637-8CD0-5CC8-85E92A71F950}"/>
+                <a16:creationId xmlns:a16="http://schemas.microsoft.com/office/drawing/2014/main" id="{B633EA15-7093-BA39-7682-01709814D4AA}"/>
               </a:ext>
             </a:extLst>
           </p:cNvPr>
@@ -870,9 +873,9 @@
           <a:bodyPr/>
           <a:lstStyle/>
           <a:p>
-            <a:fld id="{4A180DA4-5881-4B27-B989-F386607230A2}" type="datetimeFigureOut">
+            <a:fld id="{1BBDA783-43D3-4D55-9ECC-BB372A0106B9}" type="datetimeFigureOut">
               <a:rPr lang="en-US" smtClean="0"/>
-              <a:t>12/3/2024</a:t>
+              <a:t>12/9/2024</a:t>
             </a:fld>
             <a:endParaRPr lang="en-US"/>
           </a:p>
@@ -883,7 +886,7 @@
           <p:cNvPr id="5" name="Footer Placeholder 4">
             <a:extLst>
               <a:ext uri="{FF2B5EF4-FFF2-40B4-BE49-F238E27FC236}">
-                <a16:creationId xmlns:a16="http://schemas.microsoft.com/office/drawing/2014/main" id="{1D200823-0EE7-1CBC-D1D2-8130B34CCA37}"/>
+                <a16:creationId xmlns:a16="http://schemas.microsoft.com/office/drawing/2014/main" id="{F45A912E-3695-2DF7-2C20-21167F02A442}"/>
               </a:ext>
             </a:extLst>
           </p:cNvPr>
@@ -908,7 +911,7 @@
           <p:cNvPr id="6" name="Slide Number Placeholder 5">
             <a:extLst>
               <a:ext uri="{FF2B5EF4-FFF2-40B4-BE49-F238E27FC236}">
-                <a16:creationId xmlns:a16="http://schemas.microsoft.com/office/drawing/2014/main" id="{615EEC69-06E0-E371-2B94-9835C60BB801}"/>
+                <a16:creationId xmlns:a16="http://schemas.microsoft.com/office/drawing/2014/main" id="{6ACAA626-73A9-DEE8-02A3-87ACB9C93A93}"/>
               </a:ext>
             </a:extLst>
           </p:cNvPr>
@@ -924,7 +927,7 @@
           <a:bodyPr/>
           <a:lstStyle/>
           <a:p>
-            <a:fld id="{EF0A9E9B-556D-45E0-98C4-7F21B912A81C}" type="slidenum">
+            <a:fld id="{7EA376F5-AF5D-40CB-873E-8425B2D34723}" type="slidenum">
               <a:rPr lang="en-US" smtClean="0"/>
               <a:t>‹#›</a:t>
             </a:fld>
@@ -935,7 +938,7 @@
     </p:spTree>
     <p:extLst>
       <p:ext uri="{BB962C8B-B14F-4D97-AF65-F5344CB8AC3E}">
-        <p14:creationId xmlns:p14="http://schemas.microsoft.com/office/powerpoint/2010/main" val="3366497516"/>
+        <p14:creationId xmlns:p14="http://schemas.microsoft.com/office/powerpoint/2010/main" val="579904833"/>
       </p:ext>
     </p:extLst>
   </p:cSld>
@@ -967,7 +970,7 @@
           <p:cNvPr id="2" name="Title 1">
             <a:extLst>
               <a:ext uri="{FF2B5EF4-FFF2-40B4-BE49-F238E27FC236}">
-                <a16:creationId xmlns:a16="http://schemas.microsoft.com/office/drawing/2014/main" id="{A44A7ABE-4680-6043-37D5-BB8D3DB478BB}"/>
+                <a16:creationId xmlns:a16="http://schemas.microsoft.com/office/drawing/2014/main" id="{2D2D578D-F82D-328E-6AD1-5373EF495666}"/>
               </a:ext>
             </a:extLst>
           </p:cNvPr>
@@ -995,7 +998,7 @@
           <p:cNvPr id="3" name="Content Placeholder 2">
             <a:extLst>
               <a:ext uri="{FF2B5EF4-FFF2-40B4-BE49-F238E27FC236}">
-                <a16:creationId xmlns:a16="http://schemas.microsoft.com/office/drawing/2014/main" id="{32B0DF69-D3ED-A475-114E-595FE9554151}"/>
+                <a16:creationId xmlns:a16="http://schemas.microsoft.com/office/drawing/2014/main" id="{63BED67A-EF78-92F7-9FC4-E47F5A763C89}"/>
               </a:ext>
             </a:extLst>
           </p:cNvPr>
@@ -1052,7 +1055,7 @@
           <p:cNvPr id="4" name="Date Placeholder 3">
             <a:extLst>
               <a:ext uri="{FF2B5EF4-FFF2-40B4-BE49-F238E27FC236}">
-                <a16:creationId xmlns:a16="http://schemas.microsoft.com/office/drawing/2014/main" id="{7CCB13A5-A13F-D5B6-0563-4A922AA3A544}"/>
+                <a16:creationId xmlns:a16="http://schemas.microsoft.com/office/drawing/2014/main" id="{09F13685-5BAC-DB29-C54B-21CFE68CA26F}"/>
               </a:ext>
             </a:extLst>
           </p:cNvPr>
@@ -1068,9 +1071,9 @@
           <a:bodyPr/>
           <a:lstStyle/>
           <a:p>
-            <a:fld id="{4A180DA4-5881-4B27-B989-F386607230A2}" type="datetimeFigureOut">
+            <a:fld id="{1BBDA783-43D3-4D55-9ECC-BB372A0106B9}" type="datetimeFigureOut">
               <a:rPr lang="en-US" smtClean="0"/>
-              <a:t>12/3/2024</a:t>
+              <a:t>12/9/2024</a:t>
             </a:fld>
             <a:endParaRPr lang="en-US"/>
           </a:p>
@@ -1081,7 +1084,7 @@
           <p:cNvPr id="5" name="Footer Placeholder 4">
             <a:extLst>
               <a:ext uri="{FF2B5EF4-FFF2-40B4-BE49-F238E27FC236}">
-                <a16:creationId xmlns:a16="http://schemas.microsoft.com/office/drawing/2014/main" id="{B0D22E93-7D8E-F940-0005-28F9F2184854}"/>
+                <a16:creationId xmlns:a16="http://schemas.microsoft.com/office/drawing/2014/main" id="{4A2ADE6B-DDD6-8BAE-6527-8AE1B284DBA5}"/>
               </a:ext>
             </a:extLst>
           </p:cNvPr>
@@ -1106,7 +1109,7 @@
           <p:cNvPr id="6" name="Slide Number Placeholder 5">
             <a:extLst>
               <a:ext uri="{FF2B5EF4-FFF2-40B4-BE49-F238E27FC236}">
-                <a16:creationId xmlns:a16="http://schemas.microsoft.com/office/drawing/2014/main" id="{25B31285-2E4A-9F05-D1A6-DD60C9B47660}"/>
+                <a16:creationId xmlns:a16="http://schemas.microsoft.com/office/drawing/2014/main" id="{5F2526C0-B27D-EEBD-3FB8-0D88CD0ED4B2}"/>
               </a:ext>
             </a:extLst>
           </p:cNvPr>
@@ -1122,7 +1125,7 @@
           <a:bodyPr/>
           <a:lstStyle/>
           <a:p>
-            <a:fld id="{EF0A9E9B-556D-45E0-98C4-7F21B912A81C}" type="slidenum">
+            <a:fld id="{7EA376F5-AF5D-40CB-873E-8425B2D34723}" type="slidenum">
               <a:rPr lang="en-US" smtClean="0"/>
               <a:t>‹#›</a:t>
             </a:fld>
@@ -1133,7 +1136,7 @@
     </p:spTree>
     <p:extLst>
       <p:ext uri="{BB962C8B-B14F-4D97-AF65-F5344CB8AC3E}">
-        <p14:creationId xmlns:p14="http://schemas.microsoft.com/office/powerpoint/2010/main" val="1838982364"/>
+        <p14:creationId xmlns:p14="http://schemas.microsoft.com/office/powerpoint/2010/main" val="3609264838"/>
       </p:ext>
     </p:extLst>
   </p:cSld>
@@ -1165,7 +1168,7 @@
           <p:cNvPr id="2" name="Title 1">
             <a:extLst>
               <a:ext uri="{FF2B5EF4-FFF2-40B4-BE49-F238E27FC236}">
-                <a16:creationId xmlns:a16="http://schemas.microsoft.com/office/drawing/2014/main" id="{C5B10F31-A393-9695-6001-096DA894398D}"/>
+                <a16:creationId xmlns:a16="http://schemas.microsoft.com/office/drawing/2014/main" id="{09D19D47-995E-E6C1-EDF1-7F9B36049B04}"/>
               </a:ext>
             </a:extLst>
           </p:cNvPr>
@@ -1202,7 +1205,7 @@
           <p:cNvPr id="3" name="Text Placeholder 2">
             <a:extLst>
               <a:ext uri="{FF2B5EF4-FFF2-40B4-BE49-F238E27FC236}">
-                <a16:creationId xmlns:a16="http://schemas.microsoft.com/office/drawing/2014/main" id="{1EF6EE9C-10A5-F426-D8F9-3612E185571E}"/>
+                <a16:creationId xmlns:a16="http://schemas.microsoft.com/office/drawing/2014/main" id="{B31061FE-1F5F-17D5-08BC-CDD594954DEB}"/>
               </a:ext>
             </a:extLst>
           </p:cNvPr>
@@ -1327,7 +1330,7 @@
           <p:cNvPr id="4" name="Date Placeholder 3">
             <a:extLst>
               <a:ext uri="{FF2B5EF4-FFF2-40B4-BE49-F238E27FC236}">
-                <a16:creationId xmlns:a16="http://schemas.microsoft.com/office/drawing/2014/main" id="{A6755601-D310-32CD-E3F5-B22E80E98C3E}"/>
+                <a16:creationId xmlns:a16="http://schemas.microsoft.com/office/drawing/2014/main" id="{5B10FF7E-E3E4-46DF-7184-D85813BC3C4C}"/>
               </a:ext>
             </a:extLst>
           </p:cNvPr>
@@ -1343,9 +1346,9 @@
           <a:bodyPr/>
           <a:lstStyle/>
           <a:p>
-            <a:fld id="{4A180DA4-5881-4B27-B989-F386607230A2}" type="datetimeFigureOut">
+            <a:fld id="{1BBDA783-43D3-4D55-9ECC-BB372A0106B9}" type="datetimeFigureOut">
               <a:rPr lang="en-US" smtClean="0"/>
-              <a:t>12/3/2024</a:t>
+              <a:t>12/9/2024</a:t>
             </a:fld>
             <a:endParaRPr lang="en-US"/>
           </a:p>
@@ -1356,7 +1359,7 @@
           <p:cNvPr id="5" name="Footer Placeholder 4">
             <a:extLst>
               <a:ext uri="{FF2B5EF4-FFF2-40B4-BE49-F238E27FC236}">
-                <a16:creationId xmlns:a16="http://schemas.microsoft.com/office/drawing/2014/main" id="{098A45D9-E799-EF0A-E41D-8B32C4A26BFC}"/>
+                <a16:creationId xmlns:a16="http://schemas.microsoft.com/office/drawing/2014/main" id="{F1D07337-592A-471A-0F24-F2B489B88136}"/>
               </a:ext>
             </a:extLst>
           </p:cNvPr>
@@ -1381,7 +1384,7 @@
           <p:cNvPr id="6" name="Slide Number Placeholder 5">
             <a:extLst>
               <a:ext uri="{FF2B5EF4-FFF2-40B4-BE49-F238E27FC236}">
-                <a16:creationId xmlns:a16="http://schemas.microsoft.com/office/drawing/2014/main" id="{2CF074A2-88A7-FA4D-E817-CEA3925092DE}"/>
+                <a16:creationId xmlns:a16="http://schemas.microsoft.com/office/drawing/2014/main" id="{BFC32BA2-7A26-FD93-B8D8-61867D5BE602}"/>
               </a:ext>
             </a:extLst>
           </p:cNvPr>
@@ -1397,7 +1400,7 @@
           <a:bodyPr/>
           <a:lstStyle/>
           <a:p>
-            <a:fld id="{EF0A9E9B-556D-45E0-98C4-7F21B912A81C}" type="slidenum">
+            <a:fld id="{7EA376F5-AF5D-40CB-873E-8425B2D34723}" type="slidenum">
               <a:rPr lang="en-US" smtClean="0"/>
               <a:t>‹#›</a:t>
             </a:fld>
@@ -1408,7 +1411,7 @@
     </p:spTree>
     <p:extLst>
       <p:ext uri="{BB962C8B-B14F-4D97-AF65-F5344CB8AC3E}">
-        <p14:creationId xmlns:p14="http://schemas.microsoft.com/office/powerpoint/2010/main" val="2085749449"/>
+        <p14:creationId xmlns:p14="http://schemas.microsoft.com/office/powerpoint/2010/main" val="2380349756"/>
       </p:ext>
     </p:extLst>
   </p:cSld>
@@ -1440,7 +1443,7 @@
           <p:cNvPr id="2" name="Title 1">
             <a:extLst>
               <a:ext uri="{FF2B5EF4-FFF2-40B4-BE49-F238E27FC236}">
-                <a16:creationId xmlns:a16="http://schemas.microsoft.com/office/drawing/2014/main" id="{B9D4113C-A152-7A3E-4C1A-32691121BD6E}"/>
+                <a16:creationId xmlns:a16="http://schemas.microsoft.com/office/drawing/2014/main" id="{1BA921F7-A478-B983-5BB6-FD75B4DD7D65}"/>
               </a:ext>
             </a:extLst>
           </p:cNvPr>
@@ -1468,7 +1471,7 @@
           <p:cNvPr id="3" name="Content Placeholder 2">
             <a:extLst>
               <a:ext uri="{FF2B5EF4-FFF2-40B4-BE49-F238E27FC236}">
-                <a16:creationId xmlns:a16="http://schemas.microsoft.com/office/drawing/2014/main" id="{784E78CE-8509-E5FE-BE41-29776D81F74D}"/>
+                <a16:creationId xmlns:a16="http://schemas.microsoft.com/office/drawing/2014/main" id="{5F04D52E-A260-7445-56FF-96ECCFFF4B85}"/>
               </a:ext>
             </a:extLst>
           </p:cNvPr>
@@ -1530,7 +1533,7 @@
           <p:cNvPr id="4" name="Content Placeholder 3">
             <a:extLst>
               <a:ext uri="{FF2B5EF4-FFF2-40B4-BE49-F238E27FC236}">
-                <a16:creationId xmlns:a16="http://schemas.microsoft.com/office/drawing/2014/main" id="{43512F3F-7C30-6CA5-41FC-A3FF2EC0579B}"/>
+                <a16:creationId xmlns:a16="http://schemas.microsoft.com/office/drawing/2014/main" id="{DB27B1EC-3B3E-69C0-3BFF-BEFECC3AC3E2}"/>
               </a:ext>
             </a:extLst>
           </p:cNvPr>
@@ -1592,7 +1595,7 @@
           <p:cNvPr id="5" name="Date Placeholder 4">
             <a:extLst>
               <a:ext uri="{FF2B5EF4-FFF2-40B4-BE49-F238E27FC236}">
-                <a16:creationId xmlns:a16="http://schemas.microsoft.com/office/drawing/2014/main" id="{DF9F1F64-D07A-106A-F569-0A616E5076FE}"/>
+                <a16:creationId xmlns:a16="http://schemas.microsoft.com/office/drawing/2014/main" id="{1D355312-D200-2772-FAFA-4D41DB931413}"/>
               </a:ext>
             </a:extLst>
           </p:cNvPr>
@@ -1608,9 +1611,9 @@
           <a:bodyPr/>
           <a:lstStyle/>
           <a:p>
-            <a:fld id="{4A180DA4-5881-4B27-B989-F386607230A2}" type="datetimeFigureOut">
+            <a:fld id="{1BBDA783-43D3-4D55-9ECC-BB372A0106B9}" type="datetimeFigureOut">
               <a:rPr lang="en-US" smtClean="0"/>
-              <a:t>12/3/2024</a:t>
+              <a:t>12/9/2024</a:t>
             </a:fld>
             <a:endParaRPr lang="en-US"/>
           </a:p>
@@ -1621,7 +1624,7 @@
           <p:cNvPr id="6" name="Footer Placeholder 5">
             <a:extLst>
               <a:ext uri="{FF2B5EF4-FFF2-40B4-BE49-F238E27FC236}">
-                <a16:creationId xmlns:a16="http://schemas.microsoft.com/office/drawing/2014/main" id="{1B16B1AE-AC23-860C-FBB0-21E1F002D0AC}"/>
+                <a16:creationId xmlns:a16="http://schemas.microsoft.com/office/drawing/2014/main" id="{0B86772A-D804-BCB6-B6A2-B150AD4E3337}"/>
               </a:ext>
             </a:extLst>
           </p:cNvPr>
@@ -1646,7 +1649,7 @@
           <p:cNvPr id="7" name="Slide Number Placeholder 6">
             <a:extLst>
               <a:ext uri="{FF2B5EF4-FFF2-40B4-BE49-F238E27FC236}">
-                <a16:creationId xmlns:a16="http://schemas.microsoft.com/office/drawing/2014/main" id="{EB580A43-9938-7EF4-CBAA-85FC03067D76}"/>
+                <a16:creationId xmlns:a16="http://schemas.microsoft.com/office/drawing/2014/main" id="{D729DA92-E2B7-61A0-233E-A9545180BC16}"/>
               </a:ext>
             </a:extLst>
           </p:cNvPr>
@@ -1662,7 +1665,7 @@
           <a:bodyPr/>
           <a:lstStyle/>
           <a:p>
-            <a:fld id="{EF0A9E9B-556D-45E0-98C4-7F21B912A81C}" type="slidenum">
+            <a:fld id="{7EA376F5-AF5D-40CB-873E-8425B2D34723}" type="slidenum">
               <a:rPr lang="en-US" smtClean="0"/>
               <a:t>‹#›</a:t>
             </a:fld>
@@ -1673,7 +1676,7 @@
     </p:spTree>
     <p:extLst>
       <p:ext uri="{BB962C8B-B14F-4D97-AF65-F5344CB8AC3E}">
-        <p14:creationId xmlns:p14="http://schemas.microsoft.com/office/powerpoint/2010/main" val="1716938775"/>
+        <p14:creationId xmlns:p14="http://schemas.microsoft.com/office/powerpoint/2010/main" val="3226581481"/>
       </p:ext>
     </p:extLst>
   </p:cSld>
@@ -1705,7 +1708,7 @@
           <p:cNvPr id="2" name="Title 1">
             <a:extLst>
               <a:ext uri="{FF2B5EF4-FFF2-40B4-BE49-F238E27FC236}">
-                <a16:creationId xmlns:a16="http://schemas.microsoft.com/office/drawing/2014/main" id="{DE24C6C2-6172-4E6E-0879-E52959E72BE6}"/>
+                <a16:creationId xmlns:a16="http://schemas.microsoft.com/office/drawing/2014/main" id="{C47DC2CA-0B84-90CD-8955-9D303EF25817}"/>
               </a:ext>
             </a:extLst>
           </p:cNvPr>
@@ -1738,7 +1741,7 @@
           <p:cNvPr id="3" name="Text Placeholder 2">
             <a:extLst>
               <a:ext uri="{FF2B5EF4-FFF2-40B4-BE49-F238E27FC236}">
-                <a16:creationId xmlns:a16="http://schemas.microsoft.com/office/drawing/2014/main" id="{DCA40E5E-A4AF-78EE-4573-5119685B8903}"/>
+                <a16:creationId xmlns:a16="http://schemas.microsoft.com/office/drawing/2014/main" id="{296E3B93-3E22-F161-BAB0-D1493E2F81F0}"/>
               </a:ext>
             </a:extLst>
           </p:cNvPr>
@@ -1809,7 +1812,7 @@
           <p:cNvPr id="4" name="Content Placeholder 3">
             <a:extLst>
               <a:ext uri="{FF2B5EF4-FFF2-40B4-BE49-F238E27FC236}">
-                <a16:creationId xmlns:a16="http://schemas.microsoft.com/office/drawing/2014/main" id="{0C8D62FF-3045-F0C3-D47B-B261D369D439}"/>
+                <a16:creationId xmlns:a16="http://schemas.microsoft.com/office/drawing/2014/main" id="{8DB23345-0999-1EF8-0312-792BD4EE9534}"/>
               </a:ext>
             </a:extLst>
           </p:cNvPr>
@@ -1871,7 +1874,7 @@
           <p:cNvPr id="5" name="Text Placeholder 4">
             <a:extLst>
               <a:ext uri="{FF2B5EF4-FFF2-40B4-BE49-F238E27FC236}">
-                <a16:creationId xmlns:a16="http://schemas.microsoft.com/office/drawing/2014/main" id="{FADB8281-E7EB-D905-EEE2-7D22D67E22B9}"/>
+                <a16:creationId xmlns:a16="http://schemas.microsoft.com/office/drawing/2014/main" id="{0E16AC73-6703-2F5C-BE14-319033FCA168}"/>
               </a:ext>
             </a:extLst>
           </p:cNvPr>
@@ -1942,7 +1945,7 @@
           <p:cNvPr id="6" name="Content Placeholder 5">
             <a:extLst>
               <a:ext uri="{FF2B5EF4-FFF2-40B4-BE49-F238E27FC236}">
-                <a16:creationId xmlns:a16="http://schemas.microsoft.com/office/drawing/2014/main" id="{5D5C8F80-8908-9547-3C5E-B8DE43046E6F}"/>
+                <a16:creationId xmlns:a16="http://schemas.microsoft.com/office/drawing/2014/main" id="{3660A327-2C80-8914-6C36-45BA78C9FCB9}"/>
               </a:ext>
             </a:extLst>
           </p:cNvPr>
@@ -2004,7 +2007,7 @@
           <p:cNvPr id="7" name="Date Placeholder 6">
             <a:extLst>
               <a:ext uri="{FF2B5EF4-FFF2-40B4-BE49-F238E27FC236}">
-                <a16:creationId xmlns:a16="http://schemas.microsoft.com/office/drawing/2014/main" id="{0EB64FAD-9741-CFBB-B3FB-8677A94F98C0}"/>
+                <a16:creationId xmlns:a16="http://schemas.microsoft.com/office/drawing/2014/main" id="{A1CB82E8-D04B-5A9A-D2CC-5D12A19A7399}"/>
               </a:ext>
             </a:extLst>
           </p:cNvPr>
@@ -2020,9 +2023,9 @@
           <a:bodyPr/>
           <a:lstStyle/>
           <a:p>
-            <a:fld id="{4A180DA4-5881-4B27-B989-F386607230A2}" type="datetimeFigureOut">
+            <a:fld id="{1BBDA783-43D3-4D55-9ECC-BB372A0106B9}" type="datetimeFigureOut">
               <a:rPr lang="en-US" smtClean="0"/>
-              <a:t>12/3/2024</a:t>
+              <a:t>12/9/2024</a:t>
             </a:fld>
             <a:endParaRPr lang="en-US"/>
           </a:p>
@@ -2033,7 +2036,7 @@
           <p:cNvPr id="8" name="Footer Placeholder 7">
             <a:extLst>
               <a:ext uri="{FF2B5EF4-FFF2-40B4-BE49-F238E27FC236}">
-                <a16:creationId xmlns:a16="http://schemas.microsoft.com/office/drawing/2014/main" id="{811EA83D-9D79-7D25-69DD-25B2007978B1}"/>
+                <a16:creationId xmlns:a16="http://schemas.microsoft.com/office/drawing/2014/main" id="{EB9015CC-B9BB-1C00-9F3B-CDC3CB32FB8D}"/>
               </a:ext>
             </a:extLst>
           </p:cNvPr>
@@ -2058,7 +2061,7 @@
           <p:cNvPr id="9" name="Slide Number Placeholder 8">
             <a:extLst>
               <a:ext uri="{FF2B5EF4-FFF2-40B4-BE49-F238E27FC236}">
-                <a16:creationId xmlns:a16="http://schemas.microsoft.com/office/drawing/2014/main" id="{FD29BEE1-9BFA-A80A-FE47-C378A0FCE431}"/>
+                <a16:creationId xmlns:a16="http://schemas.microsoft.com/office/drawing/2014/main" id="{C2227C37-292D-34F6-8789-9D22AAF1090E}"/>
               </a:ext>
             </a:extLst>
           </p:cNvPr>
@@ -2074,7 +2077,7 @@
           <a:bodyPr/>
           <a:lstStyle/>
           <a:p>
-            <a:fld id="{EF0A9E9B-556D-45E0-98C4-7F21B912A81C}" type="slidenum">
+            <a:fld id="{7EA376F5-AF5D-40CB-873E-8425B2D34723}" type="slidenum">
               <a:rPr lang="en-US" smtClean="0"/>
               <a:t>‹#›</a:t>
             </a:fld>
@@ -2085,7 +2088,7 @@
     </p:spTree>
     <p:extLst>
       <p:ext uri="{BB962C8B-B14F-4D97-AF65-F5344CB8AC3E}">
-        <p14:creationId xmlns:p14="http://schemas.microsoft.com/office/powerpoint/2010/main" val="392755813"/>
+        <p14:creationId xmlns:p14="http://schemas.microsoft.com/office/powerpoint/2010/main" val="303307759"/>
       </p:ext>
     </p:extLst>
   </p:cSld>
@@ -2117,7 +2120,7 @@
           <p:cNvPr id="2" name="Title 1">
             <a:extLst>
               <a:ext uri="{FF2B5EF4-FFF2-40B4-BE49-F238E27FC236}">
-                <a16:creationId xmlns:a16="http://schemas.microsoft.com/office/drawing/2014/main" id="{0B6DCA78-15A8-5CFA-0AF8-3407C78FBFA6}"/>
+                <a16:creationId xmlns:a16="http://schemas.microsoft.com/office/drawing/2014/main" id="{36578630-70D2-E257-8772-60EACB064253}"/>
               </a:ext>
             </a:extLst>
           </p:cNvPr>
@@ -2145,7 +2148,7 @@
           <p:cNvPr id="3" name="Date Placeholder 2">
             <a:extLst>
               <a:ext uri="{FF2B5EF4-FFF2-40B4-BE49-F238E27FC236}">
-                <a16:creationId xmlns:a16="http://schemas.microsoft.com/office/drawing/2014/main" id="{41A7A92E-4FDC-AF75-A7D2-45F2CBA3371D}"/>
+                <a16:creationId xmlns:a16="http://schemas.microsoft.com/office/drawing/2014/main" id="{E63212B2-629F-8993-9D5B-F9547F75BF6A}"/>
               </a:ext>
             </a:extLst>
           </p:cNvPr>
@@ -2161,9 +2164,9 @@
           <a:bodyPr/>
           <a:lstStyle/>
           <a:p>
-            <a:fld id="{4A180DA4-5881-4B27-B989-F386607230A2}" type="datetimeFigureOut">
+            <a:fld id="{1BBDA783-43D3-4D55-9ECC-BB372A0106B9}" type="datetimeFigureOut">
               <a:rPr lang="en-US" smtClean="0"/>
-              <a:t>12/3/2024</a:t>
+              <a:t>12/9/2024</a:t>
             </a:fld>
             <a:endParaRPr lang="en-US"/>
           </a:p>
@@ -2174,7 +2177,7 @@
           <p:cNvPr id="4" name="Footer Placeholder 3">
             <a:extLst>
               <a:ext uri="{FF2B5EF4-FFF2-40B4-BE49-F238E27FC236}">
-                <a16:creationId xmlns:a16="http://schemas.microsoft.com/office/drawing/2014/main" id="{A3B22ACE-04F7-C05C-35E7-D6BF3C248ABB}"/>
+                <a16:creationId xmlns:a16="http://schemas.microsoft.com/office/drawing/2014/main" id="{0453754B-6523-935B-2F03-196804CA7D36}"/>
               </a:ext>
             </a:extLst>
           </p:cNvPr>
@@ -2199,7 +2202,7 @@
           <p:cNvPr id="5" name="Slide Number Placeholder 4">
             <a:extLst>
               <a:ext uri="{FF2B5EF4-FFF2-40B4-BE49-F238E27FC236}">
-                <a16:creationId xmlns:a16="http://schemas.microsoft.com/office/drawing/2014/main" id="{E43C6766-DFE5-9EEE-702C-E7B356C33AD7}"/>
+                <a16:creationId xmlns:a16="http://schemas.microsoft.com/office/drawing/2014/main" id="{8BA90411-BBD5-BA7A-61F6-40F6A937E9D8}"/>
               </a:ext>
             </a:extLst>
           </p:cNvPr>
@@ -2215,7 +2218,7 @@
           <a:bodyPr/>
           <a:lstStyle/>
           <a:p>
-            <a:fld id="{EF0A9E9B-556D-45E0-98C4-7F21B912A81C}" type="slidenum">
+            <a:fld id="{7EA376F5-AF5D-40CB-873E-8425B2D34723}" type="slidenum">
               <a:rPr lang="en-US" smtClean="0"/>
               <a:t>‹#›</a:t>
             </a:fld>
@@ -2226,7 +2229,7 @@
     </p:spTree>
     <p:extLst>
       <p:ext uri="{BB962C8B-B14F-4D97-AF65-F5344CB8AC3E}">
-        <p14:creationId xmlns:p14="http://schemas.microsoft.com/office/powerpoint/2010/main" val="2017398120"/>
+        <p14:creationId xmlns:p14="http://schemas.microsoft.com/office/powerpoint/2010/main" val="4121539000"/>
       </p:ext>
     </p:extLst>
   </p:cSld>
@@ -2258,7 +2261,7 @@
           <p:cNvPr id="2" name="Date Placeholder 1">
             <a:extLst>
               <a:ext uri="{FF2B5EF4-FFF2-40B4-BE49-F238E27FC236}">
-                <a16:creationId xmlns:a16="http://schemas.microsoft.com/office/drawing/2014/main" id="{22A8E493-F2B2-D574-2FC9-D7C9BDE90524}"/>
+                <a16:creationId xmlns:a16="http://schemas.microsoft.com/office/drawing/2014/main" id="{FD40E11B-A8E0-36BA-8732-45372F20362B}"/>
               </a:ext>
             </a:extLst>
           </p:cNvPr>
@@ -2274,9 +2277,9 @@
           <a:bodyPr/>
           <a:lstStyle/>
           <a:p>
-            <a:fld id="{4A180DA4-5881-4B27-B989-F386607230A2}" type="datetimeFigureOut">
+            <a:fld id="{1BBDA783-43D3-4D55-9ECC-BB372A0106B9}" type="datetimeFigureOut">
               <a:rPr lang="en-US" smtClean="0"/>
-              <a:t>12/3/2024</a:t>
+              <a:t>12/9/2024</a:t>
             </a:fld>
             <a:endParaRPr lang="en-US"/>
           </a:p>
@@ -2287,7 +2290,7 @@
           <p:cNvPr id="3" name="Footer Placeholder 2">
             <a:extLst>
               <a:ext uri="{FF2B5EF4-FFF2-40B4-BE49-F238E27FC236}">
-                <a16:creationId xmlns:a16="http://schemas.microsoft.com/office/drawing/2014/main" id="{28342E1C-E210-1751-430E-B956D4608BB2}"/>
+                <a16:creationId xmlns:a16="http://schemas.microsoft.com/office/drawing/2014/main" id="{75E6A1A1-01A1-EF92-18B6-69A705489979}"/>
               </a:ext>
             </a:extLst>
           </p:cNvPr>
@@ -2312,7 +2315,7 @@
           <p:cNvPr id="4" name="Slide Number Placeholder 3">
             <a:extLst>
               <a:ext uri="{FF2B5EF4-FFF2-40B4-BE49-F238E27FC236}">
-                <a16:creationId xmlns:a16="http://schemas.microsoft.com/office/drawing/2014/main" id="{E257DBAB-F0F6-B6A9-4B49-A2F010C2B32C}"/>
+                <a16:creationId xmlns:a16="http://schemas.microsoft.com/office/drawing/2014/main" id="{363B94E6-0BA6-5BFB-FDD9-616C16D347EB}"/>
               </a:ext>
             </a:extLst>
           </p:cNvPr>
@@ -2328,7 +2331,7 @@
           <a:bodyPr/>
           <a:lstStyle/>
           <a:p>
-            <a:fld id="{EF0A9E9B-556D-45E0-98C4-7F21B912A81C}" type="slidenum">
+            <a:fld id="{7EA376F5-AF5D-40CB-873E-8425B2D34723}" type="slidenum">
               <a:rPr lang="en-US" smtClean="0"/>
               <a:t>‹#›</a:t>
             </a:fld>
@@ -2339,7 +2342,7 @@
     </p:spTree>
     <p:extLst>
       <p:ext uri="{BB962C8B-B14F-4D97-AF65-F5344CB8AC3E}">
-        <p14:creationId xmlns:p14="http://schemas.microsoft.com/office/powerpoint/2010/main" val="527418573"/>
+        <p14:creationId xmlns:p14="http://schemas.microsoft.com/office/powerpoint/2010/main" val="2862991341"/>
       </p:ext>
     </p:extLst>
   </p:cSld>
@@ -2371,7 +2374,7 @@
           <p:cNvPr id="2" name="Title 1">
             <a:extLst>
               <a:ext uri="{FF2B5EF4-FFF2-40B4-BE49-F238E27FC236}">
-                <a16:creationId xmlns:a16="http://schemas.microsoft.com/office/drawing/2014/main" id="{24D2F7EB-D576-F52D-EB16-A23BFDC81BB8}"/>
+                <a16:creationId xmlns:a16="http://schemas.microsoft.com/office/drawing/2014/main" id="{99B68723-5E3A-33BA-E2FD-1D7DE87D4A92}"/>
               </a:ext>
             </a:extLst>
           </p:cNvPr>
@@ -2408,7 +2411,7 @@
           <p:cNvPr id="3" name="Content Placeholder 2">
             <a:extLst>
               <a:ext uri="{FF2B5EF4-FFF2-40B4-BE49-F238E27FC236}">
-                <a16:creationId xmlns:a16="http://schemas.microsoft.com/office/drawing/2014/main" id="{FCFFF135-7F40-D821-9E15-F48BA2F9CCFE}"/>
+                <a16:creationId xmlns:a16="http://schemas.microsoft.com/office/drawing/2014/main" id="{2D1ACFCF-A4D4-66E2-E42E-81D3B18322B8}"/>
               </a:ext>
             </a:extLst>
           </p:cNvPr>
@@ -2498,7 +2501,7 @@
           <p:cNvPr id="4" name="Text Placeholder 3">
             <a:extLst>
               <a:ext uri="{FF2B5EF4-FFF2-40B4-BE49-F238E27FC236}">
-                <a16:creationId xmlns:a16="http://schemas.microsoft.com/office/drawing/2014/main" id="{DDC6AA3A-C52C-D50A-1596-61E6BF177A54}"/>
+                <a16:creationId xmlns:a16="http://schemas.microsoft.com/office/drawing/2014/main" id="{57AC1939-4A49-451E-1303-DBFF8010A935}"/>
               </a:ext>
             </a:extLst>
           </p:cNvPr>
@@ -2569,7 +2572,7 @@
           <p:cNvPr id="5" name="Date Placeholder 4">
             <a:extLst>
               <a:ext uri="{FF2B5EF4-FFF2-40B4-BE49-F238E27FC236}">
-                <a16:creationId xmlns:a16="http://schemas.microsoft.com/office/drawing/2014/main" id="{3941A43D-2703-44BD-92D2-1DA92ECCFA57}"/>
+                <a16:creationId xmlns:a16="http://schemas.microsoft.com/office/drawing/2014/main" id="{50BC701B-32E2-50BB-2F6D-8BCA396CD636}"/>
               </a:ext>
             </a:extLst>
           </p:cNvPr>
@@ -2585,9 +2588,9 @@
           <a:bodyPr/>
           <a:lstStyle/>
           <a:p>
-            <a:fld id="{4A180DA4-5881-4B27-B989-F386607230A2}" type="datetimeFigureOut">
+            <a:fld id="{1BBDA783-43D3-4D55-9ECC-BB372A0106B9}" type="datetimeFigureOut">
               <a:rPr lang="en-US" smtClean="0"/>
-              <a:t>12/3/2024</a:t>
+              <a:t>12/9/2024</a:t>
             </a:fld>
             <a:endParaRPr lang="en-US"/>
           </a:p>
@@ -2598,7 +2601,7 @@
           <p:cNvPr id="6" name="Footer Placeholder 5">
             <a:extLst>
               <a:ext uri="{FF2B5EF4-FFF2-40B4-BE49-F238E27FC236}">
-                <a16:creationId xmlns:a16="http://schemas.microsoft.com/office/drawing/2014/main" id="{A0A90F4E-F56D-74E3-79F2-C7D7E6E52198}"/>
+                <a16:creationId xmlns:a16="http://schemas.microsoft.com/office/drawing/2014/main" id="{78D06B15-5CA6-3241-31D4-9B22B47C8C7B}"/>
               </a:ext>
             </a:extLst>
           </p:cNvPr>
@@ -2623,7 +2626,7 @@
           <p:cNvPr id="7" name="Slide Number Placeholder 6">
             <a:extLst>
               <a:ext uri="{FF2B5EF4-FFF2-40B4-BE49-F238E27FC236}">
-                <a16:creationId xmlns:a16="http://schemas.microsoft.com/office/drawing/2014/main" id="{94722DD8-F487-3512-EC3C-906559048A4B}"/>
+                <a16:creationId xmlns:a16="http://schemas.microsoft.com/office/drawing/2014/main" id="{1B35DCFF-12F3-1E9E-7E8D-DCE3F5ABDCBF}"/>
               </a:ext>
             </a:extLst>
           </p:cNvPr>
@@ -2639,7 +2642,7 @@
           <a:bodyPr/>
           <a:lstStyle/>
           <a:p>
-            <a:fld id="{EF0A9E9B-556D-45E0-98C4-7F21B912A81C}" type="slidenum">
+            <a:fld id="{7EA376F5-AF5D-40CB-873E-8425B2D34723}" type="slidenum">
               <a:rPr lang="en-US" smtClean="0"/>
               <a:t>‹#›</a:t>
             </a:fld>
@@ -2650,7 +2653,7 @@
     </p:spTree>
     <p:extLst>
       <p:ext uri="{BB962C8B-B14F-4D97-AF65-F5344CB8AC3E}">
-        <p14:creationId xmlns:p14="http://schemas.microsoft.com/office/powerpoint/2010/main" val="2166692505"/>
+        <p14:creationId xmlns:p14="http://schemas.microsoft.com/office/powerpoint/2010/main" val="2132993446"/>
       </p:ext>
     </p:extLst>
   </p:cSld>
@@ -2682,7 +2685,7 @@
           <p:cNvPr id="2" name="Title 1">
             <a:extLst>
               <a:ext uri="{FF2B5EF4-FFF2-40B4-BE49-F238E27FC236}">
-                <a16:creationId xmlns:a16="http://schemas.microsoft.com/office/drawing/2014/main" id="{CB50A29B-A03A-442D-3230-0954B4E94340}"/>
+                <a16:creationId xmlns:a16="http://schemas.microsoft.com/office/drawing/2014/main" id="{9B3AB770-0F47-FBE2-4A9C-8025EB9E8A5F}"/>
               </a:ext>
             </a:extLst>
           </p:cNvPr>
@@ -2719,7 +2722,7 @@
           <p:cNvPr id="3" name="Picture Placeholder 2">
             <a:extLst>
               <a:ext uri="{FF2B5EF4-FFF2-40B4-BE49-F238E27FC236}">
-                <a16:creationId xmlns:a16="http://schemas.microsoft.com/office/drawing/2014/main" id="{A7A027DB-6C3E-B5C7-4BE8-AE3E1F8D1BD3}"/>
+                <a16:creationId xmlns:a16="http://schemas.microsoft.com/office/drawing/2014/main" id="{0A24527D-D893-F923-C1D5-702414549FC9}"/>
               </a:ext>
             </a:extLst>
           </p:cNvPr>
@@ -2786,7 +2789,7 @@
           <p:cNvPr id="4" name="Text Placeholder 3">
             <a:extLst>
               <a:ext uri="{FF2B5EF4-FFF2-40B4-BE49-F238E27FC236}">
-                <a16:creationId xmlns:a16="http://schemas.microsoft.com/office/drawing/2014/main" id="{114F1E73-EA5D-B509-C62A-226F0A5F29C6}"/>
+                <a16:creationId xmlns:a16="http://schemas.microsoft.com/office/drawing/2014/main" id="{52F2549C-B1FE-0547-BE63-EEABD9473B6A}"/>
               </a:ext>
             </a:extLst>
           </p:cNvPr>
@@ -2857,7 +2860,7 @@
           <p:cNvPr id="5" name="Date Placeholder 4">
             <a:extLst>
               <a:ext uri="{FF2B5EF4-FFF2-40B4-BE49-F238E27FC236}">
-                <a16:creationId xmlns:a16="http://schemas.microsoft.com/office/drawing/2014/main" id="{95C352B3-6C99-8863-74C7-4466F269DF6E}"/>
+                <a16:creationId xmlns:a16="http://schemas.microsoft.com/office/drawing/2014/main" id="{4697FD60-E752-629A-DE8E-90EF93F91B1D}"/>
               </a:ext>
             </a:extLst>
           </p:cNvPr>
@@ -2873,9 +2876,9 @@
           <a:bodyPr/>
           <a:lstStyle/>
           <a:p>
-            <a:fld id="{4A180DA4-5881-4B27-B989-F386607230A2}" type="datetimeFigureOut">
+            <a:fld id="{1BBDA783-43D3-4D55-9ECC-BB372A0106B9}" type="datetimeFigureOut">
               <a:rPr lang="en-US" smtClean="0"/>
-              <a:t>12/3/2024</a:t>
+              <a:t>12/9/2024</a:t>
             </a:fld>
             <a:endParaRPr lang="en-US"/>
           </a:p>
@@ -2886,7 +2889,7 @@
           <p:cNvPr id="6" name="Footer Placeholder 5">
             <a:extLst>
               <a:ext uri="{FF2B5EF4-FFF2-40B4-BE49-F238E27FC236}">
-                <a16:creationId xmlns:a16="http://schemas.microsoft.com/office/drawing/2014/main" id="{619D08CC-4515-A93E-2D3E-A07C43BF66A5}"/>
+                <a16:creationId xmlns:a16="http://schemas.microsoft.com/office/drawing/2014/main" id="{9605B6B8-64A9-61C9-71AF-78E58767C59F}"/>
               </a:ext>
             </a:extLst>
           </p:cNvPr>
@@ -2911,7 +2914,7 @@
           <p:cNvPr id="7" name="Slide Number Placeholder 6">
             <a:extLst>
               <a:ext uri="{FF2B5EF4-FFF2-40B4-BE49-F238E27FC236}">
-                <a16:creationId xmlns:a16="http://schemas.microsoft.com/office/drawing/2014/main" id="{E4A752E3-8B64-1619-63E2-8E99B9E80081}"/>
+                <a16:creationId xmlns:a16="http://schemas.microsoft.com/office/drawing/2014/main" id="{4DEFA9C9-392B-FCCA-D944-65516D2FD467}"/>
               </a:ext>
             </a:extLst>
           </p:cNvPr>
@@ -2927,7 +2930,7 @@
           <a:bodyPr/>
           <a:lstStyle/>
           <a:p>
-            <a:fld id="{EF0A9E9B-556D-45E0-98C4-7F21B912A81C}" type="slidenum">
+            <a:fld id="{7EA376F5-AF5D-40CB-873E-8425B2D34723}" type="slidenum">
               <a:rPr lang="en-US" smtClean="0"/>
               <a:t>‹#›</a:t>
             </a:fld>
@@ -2938,7 +2941,7 @@
     </p:spTree>
     <p:extLst>
       <p:ext uri="{BB962C8B-B14F-4D97-AF65-F5344CB8AC3E}">
-        <p14:creationId xmlns:p14="http://schemas.microsoft.com/office/powerpoint/2010/main" val="841559714"/>
+        <p14:creationId xmlns:p14="http://schemas.microsoft.com/office/powerpoint/2010/main" val="603197593"/>
       </p:ext>
     </p:extLst>
   </p:cSld>
@@ -2975,7 +2978,7 @@
           <p:cNvPr id="2" name="Title Placeholder 1">
             <a:extLst>
               <a:ext uri="{FF2B5EF4-FFF2-40B4-BE49-F238E27FC236}">
-                <a16:creationId xmlns:a16="http://schemas.microsoft.com/office/drawing/2014/main" id="{5C5D5AD3-DF31-D897-953F-4C481AC9E872}"/>
+                <a16:creationId xmlns:a16="http://schemas.microsoft.com/office/drawing/2014/main" id="{7FB91E5F-60CB-985B-7EA5-6D11CD0A15E0}"/>
               </a:ext>
             </a:extLst>
           </p:cNvPr>
@@ -3013,7 +3016,7 @@
           <p:cNvPr id="3" name="Text Placeholder 2">
             <a:extLst>
               <a:ext uri="{FF2B5EF4-FFF2-40B4-BE49-F238E27FC236}">
-                <a16:creationId xmlns:a16="http://schemas.microsoft.com/office/drawing/2014/main" id="{D30239C0-FDD6-900E-C7B0-8ABEBD0A2737}"/>
+                <a16:creationId xmlns:a16="http://schemas.microsoft.com/office/drawing/2014/main" id="{1F5369CA-4A69-21BE-D8B2-238A04700F1B}"/>
               </a:ext>
             </a:extLst>
           </p:cNvPr>
@@ -3080,7 +3083,7 @@
           <p:cNvPr id="4" name="Date Placeholder 3">
             <a:extLst>
               <a:ext uri="{FF2B5EF4-FFF2-40B4-BE49-F238E27FC236}">
-                <a16:creationId xmlns:a16="http://schemas.microsoft.com/office/drawing/2014/main" id="{74197222-046A-1E73-F3BE-9BD696EF8042}"/>
+                <a16:creationId xmlns:a16="http://schemas.microsoft.com/office/drawing/2014/main" id="{E1B8B7C6-1BEA-A26A-F4CA-569A5F21C5F5}"/>
               </a:ext>
             </a:extLst>
           </p:cNvPr>
@@ -3114,9 +3117,9 @@
             </a:lvl1pPr>
           </a:lstStyle>
           <a:p>
-            <a:fld id="{4A180DA4-5881-4B27-B989-F386607230A2}" type="datetimeFigureOut">
+            <a:fld id="{1BBDA783-43D3-4D55-9ECC-BB372A0106B9}" type="datetimeFigureOut">
               <a:rPr lang="en-US" smtClean="0"/>
-              <a:t>12/3/2024</a:t>
+              <a:t>12/9/2024</a:t>
             </a:fld>
             <a:endParaRPr lang="en-US"/>
           </a:p>
@@ -3127,7 +3130,7 @@
           <p:cNvPr id="5" name="Footer Placeholder 4">
             <a:extLst>
               <a:ext uri="{FF2B5EF4-FFF2-40B4-BE49-F238E27FC236}">
-                <a16:creationId xmlns:a16="http://schemas.microsoft.com/office/drawing/2014/main" id="{D7773FAB-6D1F-1883-CCFA-E516CF878491}"/>
+                <a16:creationId xmlns:a16="http://schemas.microsoft.com/office/drawing/2014/main" id="{CBE9205E-053B-FBE2-23A6-D731405A867A}"/>
               </a:ext>
             </a:extLst>
           </p:cNvPr>
@@ -3170,7 +3173,7 @@
           <p:cNvPr id="6" name="Slide Number Placeholder 5">
             <a:extLst>
               <a:ext uri="{FF2B5EF4-FFF2-40B4-BE49-F238E27FC236}">
-                <a16:creationId xmlns:a16="http://schemas.microsoft.com/office/drawing/2014/main" id="{7215E823-871A-6346-E94D-AA7F49F694B0}"/>
+                <a16:creationId xmlns:a16="http://schemas.microsoft.com/office/drawing/2014/main" id="{34155075-3631-9330-0CD5-99631EF71E4E}"/>
               </a:ext>
             </a:extLst>
           </p:cNvPr>
@@ -3204,7 +3207,7 @@
             </a:lvl1pPr>
           </a:lstStyle>
           <a:p>
-            <a:fld id="{EF0A9E9B-556D-45E0-98C4-7F21B912A81C}" type="slidenum">
+            <a:fld id="{7EA376F5-AF5D-40CB-873E-8425B2D34723}" type="slidenum">
               <a:rPr lang="en-US" smtClean="0"/>
               <a:t>‹#›</a:t>
             </a:fld>
@@ -3215,7 +3218,7 @@
     </p:spTree>
     <p:extLst>
       <p:ext uri="{BB962C8B-B14F-4D97-AF65-F5344CB8AC3E}">
-        <p14:creationId xmlns:p14="http://schemas.microsoft.com/office/powerpoint/2010/main" val="987493358"/>
+        <p14:creationId xmlns:p14="http://schemas.microsoft.com/office/powerpoint/2010/main" val="4029287040"/>
       </p:ext>
     </p:extLst>
   </p:cSld>
@@ -3539,7 +3542,7 @@
           <p:cNvPr id="2" name="Title 1">
             <a:extLst>
               <a:ext uri="{FF2B5EF4-FFF2-40B4-BE49-F238E27FC236}">
-                <a16:creationId xmlns:a16="http://schemas.microsoft.com/office/drawing/2014/main" id="{A7C141A4-8F68-807A-AE5D-5BBCBBB96985}"/>
+                <a16:creationId xmlns:a16="http://schemas.microsoft.com/office/drawing/2014/main" id="{2612237C-8AB7-F39C-90F6-056166EA76AB}"/>
               </a:ext>
             </a:extLst>
           </p:cNvPr>
@@ -3557,7 +3560,7 @@
           <a:p>
             <a:r>
               <a:rPr lang="en-US"/>
-              <a:t>Assignment Presentation</a:t>
+              <a:t>Document Search Engine</a:t>
             </a:r>
           </a:p>
         </p:txBody>
@@ -3567,7 +3570,7 @@
           <p:cNvPr id="3" name="Subtitle 2">
             <a:extLst>
               <a:ext uri="{FF2B5EF4-FFF2-40B4-BE49-F238E27FC236}">
-                <a16:creationId xmlns:a16="http://schemas.microsoft.com/office/drawing/2014/main" id="{7B3D1410-264D-C7AC-F5B1-37153D2840B9}"/>
+                <a16:creationId xmlns:a16="http://schemas.microsoft.com/office/drawing/2014/main" id="{879484BC-DEC2-4A68-DD87-6FA436E29E66}"/>
               </a:ext>
             </a:extLst>
           </p:cNvPr>
@@ -3585,7 +3588,7 @@
           <a:p>
             <a:r>
               <a:rPr lang="en-US"/>
-              <a:t>Understanding the Models and Process</a:t>
+              <a:t>Introduction to the Document Search Engine with Binary Independence Model, Non-Overlapped Lists, and Proximal Nodes</a:t>
             </a:r>
           </a:p>
         </p:txBody>
@@ -3593,7 +3596,7 @@
     </p:spTree>
     <p:extLst>
       <p:ext uri="{BB962C8B-B14F-4D97-AF65-F5344CB8AC3E}">
-        <p14:creationId xmlns:p14="http://schemas.microsoft.com/office/powerpoint/2010/main" val="2778862781"/>
+        <p14:creationId xmlns:p14="http://schemas.microsoft.com/office/powerpoint/2010/main" val="3444834815"/>
       </p:ext>
     </p:extLst>
   </p:cSld>
@@ -3604,6 +3607,289 @@
 </file>
 
 <file path=ppt/slides/slide10.xml><?xml version="1.0" encoding="utf-8"?>
+<p:sld xmlns:a="http://schemas.openxmlformats.org/drawingml/2006/main" xmlns:r="http://schemas.openxmlformats.org/officeDocument/2006/relationships" xmlns:p="http://schemas.openxmlformats.org/presentationml/2006/main">
+  <p:cSld>
+    <p:spTree>
+      <p:nvGrpSpPr>
+        <p:cNvPr id="1" name="">
+          <a:extLst>
+            <a:ext uri="{FF2B5EF4-FFF2-40B4-BE49-F238E27FC236}">
+              <a16:creationId xmlns:a16="http://schemas.microsoft.com/office/drawing/2014/main" id="{BBFD28EB-5793-BBE3-7F7D-2B568D02908D}"/>
+            </a:ext>
+          </a:extLst>
+        </p:cNvPr>
+        <p:cNvGrpSpPr/>
+        <p:nvPr/>
+      </p:nvGrpSpPr>
+      <p:grpSpPr>
+        <a:xfrm>
+          <a:off x="0" y="0"/>
+          <a:ext cx="0" cy="0"/>
+          <a:chOff x="0" y="0"/>
+          <a:chExt cx="0" cy="0"/>
+        </a:xfrm>
+      </p:grpSpPr>
+      <p:sp>
+        <p:nvSpPr>
+          <p:cNvPr id="2" name="Title 1">
+            <a:extLst>
+              <a:ext uri="{FF2B5EF4-FFF2-40B4-BE49-F238E27FC236}">
+                <a16:creationId xmlns:a16="http://schemas.microsoft.com/office/drawing/2014/main" id="{077178B1-C248-5B69-C480-D1719B6CC7F7}"/>
+              </a:ext>
+            </a:extLst>
+          </p:cNvPr>
+          <p:cNvSpPr>
+            <a:spLocks noGrp="1"/>
+          </p:cNvSpPr>
+          <p:nvPr>
+            <p:ph type="title"/>
+          </p:nvPr>
+        </p:nvSpPr>
+        <p:spPr/>
+        <p:txBody>
+          <a:bodyPr/>
+          <a:lstStyle/>
+          <a:p>
+            <a:r>
+              <a:rPr lang="en-US" dirty="0"/>
+              <a:t>DFD Explanation</a:t>
+            </a:r>
+          </a:p>
+        </p:txBody>
+      </p:sp>
+      <p:sp>
+        <p:nvSpPr>
+          <p:cNvPr id="3" name="Text Placeholder 2">
+            <a:extLst>
+              <a:ext uri="{FF2B5EF4-FFF2-40B4-BE49-F238E27FC236}">
+                <a16:creationId xmlns:a16="http://schemas.microsoft.com/office/drawing/2014/main" id="{EE6FD3EA-44FE-C062-CFD8-108344F2CD91}"/>
+              </a:ext>
+            </a:extLst>
+          </p:cNvPr>
+          <p:cNvSpPr>
+            <a:spLocks noGrp="1"/>
+          </p:cNvSpPr>
+          <p:nvPr>
+            <p:ph type="body" idx="1"/>
+          </p:nvPr>
+        </p:nvSpPr>
+        <p:spPr/>
+        <p:txBody>
+          <a:bodyPr>
+            <a:normAutofit/>
+          </a:bodyPr>
+          <a:lstStyle/>
+          <a:p>
+            <a:pPr eaLnBrk="0" fontAlgn="base" hangingPunct="0">
+              <a:lnSpc>
+                <a:spcPct val="100000"/>
+              </a:lnSpc>
+              <a:spcBef>
+                <a:spcPct val="0"/>
+              </a:spcBef>
+              <a:spcAft>
+                <a:spcPct val="0"/>
+              </a:spcAft>
+            </a:pPr>
+            <a:r>
+              <a:rPr kumimoji="0" lang="en-US" altLang="en-US" sz="2400" b="1" i="0" u="none" strike="noStrike" cap="none" normalizeH="0" baseline="0" dirty="0">
+                <a:ln>
+                  <a:noFill/>
+                </a:ln>
+                <a:solidFill>
+                  <a:schemeClr val="tx1"/>
+                </a:solidFill>
+                <a:effectLst/>
+                <a:latin typeface="Arial" panose="020B0604020202020204" pitchFamily="34" charset="0"/>
+              </a:rPr>
+              <a:t>Select File:</a:t>
+            </a:r>
+            <a:r>
+              <a:rPr kumimoji="0" lang="en-US" altLang="en-US" sz="2400" b="0" i="0" u="none" strike="noStrike" cap="none" normalizeH="0" baseline="0" dirty="0">
+                <a:ln>
+                  <a:noFill/>
+                </a:ln>
+                <a:solidFill>
+                  <a:schemeClr val="tx1"/>
+                </a:solidFill>
+                <a:effectLst/>
+                <a:latin typeface="Arial" panose="020B0604020202020204" pitchFamily="34" charset="0"/>
+              </a:rPr>
+              <a:t> The user selects a file to upload. </a:t>
+            </a:r>
+          </a:p>
+          <a:p>
+            <a:pPr eaLnBrk="0" fontAlgn="base" hangingPunct="0">
+              <a:lnSpc>
+                <a:spcPct val="100000"/>
+              </a:lnSpc>
+              <a:spcBef>
+                <a:spcPct val="0"/>
+              </a:spcBef>
+              <a:spcAft>
+                <a:spcPct val="0"/>
+              </a:spcAft>
+            </a:pPr>
+            <a:r>
+              <a:rPr kumimoji="0" lang="en-US" altLang="en-US" sz="2400" b="1" i="0" u="none" strike="noStrike" cap="none" normalizeH="0" baseline="0" dirty="0">
+                <a:ln>
+                  <a:noFill/>
+                </a:ln>
+                <a:solidFill>
+                  <a:schemeClr val="tx1"/>
+                </a:solidFill>
+                <a:effectLst/>
+                <a:latin typeface="Arial" panose="020B0604020202020204" pitchFamily="34" charset="0"/>
+              </a:rPr>
+              <a:t>Store Document:</a:t>
+            </a:r>
+            <a:r>
+              <a:rPr kumimoji="0" lang="en-US" altLang="en-US" sz="2400" b="0" i="0" u="none" strike="noStrike" cap="none" normalizeH="0" baseline="0" dirty="0">
+                <a:ln>
+                  <a:noFill/>
+                </a:ln>
+                <a:solidFill>
+                  <a:schemeClr val="tx1"/>
+                </a:solidFill>
+                <a:effectLst/>
+                <a:latin typeface="Arial" panose="020B0604020202020204" pitchFamily="34" charset="0"/>
+              </a:rPr>
+              <a:t> The uploaded document is stored in the Document Directory. </a:t>
+            </a:r>
+          </a:p>
+          <a:p>
+            <a:pPr eaLnBrk="0" fontAlgn="base" hangingPunct="0">
+              <a:lnSpc>
+                <a:spcPct val="100000"/>
+              </a:lnSpc>
+              <a:spcBef>
+                <a:spcPct val="0"/>
+              </a:spcBef>
+              <a:spcAft>
+                <a:spcPct val="0"/>
+              </a:spcAft>
+            </a:pPr>
+            <a:r>
+              <a:rPr kumimoji="0" lang="en-US" altLang="en-US" sz="2400" b="1" i="0" u="none" strike="noStrike" cap="none" normalizeH="0" baseline="0" dirty="0">
+                <a:ln>
+                  <a:noFill/>
+                </a:ln>
+                <a:solidFill>
+                  <a:schemeClr val="tx1"/>
+                </a:solidFill>
+                <a:effectLst/>
+                <a:latin typeface="Arial" panose="020B0604020202020204" pitchFamily="34" charset="0"/>
+              </a:rPr>
+              <a:t>Parameters:</a:t>
+            </a:r>
+            <a:r>
+              <a:rPr kumimoji="0" lang="en-US" altLang="en-US" sz="2400" b="0" i="0" u="none" strike="noStrike" cap="none" normalizeH="0" baseline="0" dirty="0">
+                <a:ln>
+                  <a:noFill/>
+                </a:ln>
+                <a:solidFill>
+                  <a:schemeClr val="tx1"/>
+                </a:solidFill>
+                <a:effectLst/>
+                <a:latin typeface="Arial" panose="020B0604020202020204" pitchFamily="34" charset="0"/>
+              </a:rPr>
+              <a:t> The user provides parameters (search query) to the search process. </a:t>
+            </a:r>
+          </a:p>
+          <a:p>
+            <a:pPr eaLnBrk="0" fontAlgn="base" hangingPunct="0">
+              <a:lnSpc>
+                <a:spcPct val="100000"/>
+              </a:lnSpc>
+              <a:spcBef>
+                <a:spcPct val="0"/>
+              </a:spcBef>
+              <a:spcAft>
+                <a:spcPct val="0"/>
+              </a:spcAft>
+            </a:pPr>
+            <a:r>
+              <a:rPr kumimoji="0" lang="en-US" altLang="en-US" sz="2400" b="1" i="0" u="none" strike="noStrike" cap="none" normalizeH="0" baseline="0" dirty="0">
+                <a:ln>
+                  <a:noFill/>
+                </a:ln>
+                <a:solidFill>
+                  <a:schemeClr val="tx1"/>
+                </a:solidFill>
+                <a:effectLst/>
+                <a:latin typeface="Arial" panose="020B0604020202020204" pitchFamily="34" charset="0"/>
+              </a:rPr>
+              <a:t>Search Query:</a:t>
+            </a:r>
+            <a:r>
+              <a:rPr kumimoji="0" lang="en-US" altLang="en-US" sz="2400" b="0" i="0" u="none" strike="noStrike" cap="none" normalizeH="0" baseline="0" dirty="0">
+                <a:ln>
+                  <a:noFill/>
+                </a:ln>
+                <a:solidFill>
+                  <a:schemeClr val="tx1"/>
+                </a:solidFill>
+                <a:effectLst/>
+                <a:latin typeface="Arial" panose="020B0604020202020204" pitchFamily="34" charset="0"/>
+              </a:rPr>
+              <a:t> The search query is passed to the search process. </a:t>
+            </a:r>
+          </a:p>
+          <a:p>
+            <a:pPr eaLnBrk="0" fontAlgn="base" hangingPunct="0">
+              <a:lnSpc>
+                <a:spcPct val="100000"/>
+              </a:lnSpc>
+              <a:spcBef>
+                <a:spcPct val="0"/>
+              </a:spcBef>
+              <a:spcAft>
+                <a:spcPct val="0"/>
+              </a:spcAft>
+            </a:pPr>
+            <a:r>
+              <a:rPr kumimoji="0" lang="en-US" altLang="en-US" sz="2400" b="1" i="0" u="none" strike="noStrike" cap="none" normalizeH="0" baseline="0" dirty="0">
+                <a:ln>
+                  <a:noFill/>
+                </a:ln>
+                <a:solidFill>
+                  <a:schemeClr val="tx1"/>
+                </a:solidFill>
+                <a:effectLst/>
+                <a:latin typeface="Arial" panose="020B0604020202020204" pitchFamily="34" charset="0"/>
+              </a:rPr>
+              <a:t>Response:</a:t>
+            </a:r>
+            <a:r>
+              <a:rPr kumimoji="0" lang="en-US" altLang="en-US" sz="2400" b="0" i="0" u="none" strike="noStrike" cap="none" normalizeH="0" baseline="0" dirty="0">
+                <a:ln>
+                  <a:noFill/>
+                </a:ln>
+                <a:solidFill>
+                  <a:schemeClr val="tx1"/>
+                </a:solidFill>
+                <a:effectLst/>
+                <a:latin typeface="Arial" panose="020B0604020202020204" pitchFamily="34" charset="0"/>
+              </a:rPr>
+              <a:t> The search results are displayed to the user. </a:t>
+            </a:r>
+          </a:p>
+        </p:txBody>
+      </p:sp>
+    </p:spTree>
+    <p:extLst>
+      <p:ext uri="{BB962C8B-B14F-4D97-AF65-F5344CB8AC3E}">
+        <p14:creationId xmlns:p14="http://schemas.microsoft.com/office/powerpoint/2010/main" val="1062613728"/>
+      </p:ext>
+    </p:extLst>
+  </p:cSld>
+  <p:clrMapOvr>
+    <a:masterClrMapping/>
+  </p:clrMapOvr>
+</p:sld>
+</file>
+
+<file path=ppt/slides/slide11.xml><?xml version="1.0" encoding="utf-8"?>
 <p:sld xmlns:a="http://schemas.openxmlformats.org/drawingml/2006/main" xmlns:r="http://schemas.openxmlformats.org/officeDocument/2006/relationships" xmlns:p="http://schemas.openxmlformats.org/presentationml/2006/main">
   <p:cSld>
     <p:spTree>
@@ -3625,7 +3911,7 @@
           <p:cNvPr id="2" name="Title 1">
             <a:extLst>
               <a:ext uri="{FF2B5EF4-FFF2-40B4-BE49-F238E27FC236}">
-                <a16:creationId xmlns:a16="http://schemas.microsoft.com/office/drawing/2014/main" id="{A60FE7B4-1F53-2DE7-C5FA-7D5E35F1ED0A}"/>
+                <a16:creationId xmlns:a16="http://schemas.microsoft.com/office/drawing/2014/main" id="{BFD666D1-E750-E5F4-46B0-B533BDA293AC}"/>
               </a:ext>
             </a:extLst>
           </p:cNvPr>
@@ -3643,300 +3929,47 @@
           <a:p>
             <a:r>
               <a:rPr lang="en-US"/>
-              <a:t>Proximal Nodes Model</a:t>
-            </a:r>
-          </a:p>
-        </p:txBody>
-      </p:sp>
-      <p:sp>
-        <p:nvSpPr>
-          <p:cNvPr id="5" name="Rectangle 2">
-            <a:extLst>
-              <a:ext uri="{FF2B5EF4-FFF2-40B4-BE49-F238E27FC236}">
-                <a16:creationId xmlns:a16="http://schemas.microsoft.com/office/drawing/2014/main" id="{8A0DA5BC-85A8-E5F0-9A17-9733C0E7B914}"/>
-              </a:ext>
-            </a:extLst>
-          </p:cNvPr>
-          <p:cNvSpPr>
-            <a:spLocks noChangeArrowheads="1"/>
-          </p:cNvSpPr>
-          <p:nvPr/>
-        </p:nvSpPr>
-        <p:spPr bwMode="auto">
-          <a:xfrm>
-            <a:off x="838201" y="1512014"/>
-            <a:ext cx="10450132" cy="4832092"/>
-          </a:xfrm>
-          <a:prstGeom prst="rect">
-            <a:avLst/>
-          </a:prstGeom>
-          <a:noFill/>
-          <a:ln>
-            <a:noFill/>
-          </a:ln>
-          <a:effectLst/>
-          <a:extLst>
-            <a:ext uri="{909E8E84-426E-40DD-AFC4-6F175D3DCCD1}">
-              <a14:hiddenFill xmlns:a14="http://schemas.microsoft.com/office/drawing/2010/main">
-                <a:solidFill>
-                  <a:schemeClr val="accent1"/>
-                </a:solidFill>
-              </a14:hiddenFill>
-            </a:ext>
-            <a:ext uri="{91240B29-F687-4F45-9708-019B960494DF}">
-              <a14:hiddenLine xmlns:a14="http://schemas.microsoft.com/office/drawing/2010/main" w="9525">
-                <a:solidFill>
-                  <a:schemeClr val="tx1"/>
-                </a:solidFill>
-                <a:miter lim="800000"/>
-                <a:headEnd/>
-                <a:tailEnd/>
-              </a14:hiddenLine>
-            </a:ext>
-            <a:ext uri="{AF507438-7753-43E0-B8FC-AC1667EBCBE1}">
-              <a14:hiddenEffects xmlns:a14="http://schemas.microsoft.com/office/drawing/2010/main">
-                <a:effectLst>
-                  <a:outerShdw dist="35921" dir="2700000" algn="ctr" rotWithShape="0">
-                    <a:schemeClr val="bg2"/>
-                  </a:outerShdw>
-                </a:effectLst>
-              </a14:hiddenEffects>
-            </a:ext>
-          </a:extLst>
-        </p:spPr>
-        <p:txBody>
-          <a:bodyPr vert="horz" wrap="square" lIns="91440" tIns="45720" rIns="91440" bIns="45720" numCol="1" anchor="ctr" anchorCtr="0" compatLnSpc="1">
-            <a:prstTxWarp prst="textNoShape">
-              <a:avLst/>
-            </a:prstTxWarp>
-            <a:spAutoFit/>
-          </a:bodyPr>
-          <a:lstStyle/>
-          <a:p>
-            <a:pPr marL="0" marR="0" lvl="0" indent="0" algn="l" defTabSz="914400" rtl="0" eaLnBrk="0" fontAlgn="base" latinLnBrk="0" hangingPunct="0">
-              <a:lnSpc>
-                <a:spcPct val="100000"/>
-              </a:lnSpc>
-              <a:spcBef>
-                <a:spcPct val="0"/>
-              </a:spcBef>
-              <a:spcAft>
-                <a:spcPct val="0"/>
-              </a:spcAft>
-              <a:buClrTx/>
-              <a:buSzTx/>
-              <a:tabLst/>
-            </a:pPr>
-            <a:r>
-              <a:rPr kumimoji="0" lang="en-US" altLang="en-US" sz="2800" b="1" i="0" u="none" strike="noStrike" cap="none" normalizeH="0" baseline="0" dirty="0">
-                <a:ln>
-                  <a:noFill/>
-                </a:ln>
-                <a:solidFill>
-                  <a:schemeClr val="tx1"/>
-                </a:solidFill>
-                <a:effectLst/>
-                <a:latin typeface="Arial" panose="020B0604020202020204" pitchFamily="34" charset="0"/>
-              </a:rPr>
-              <a:t>Purpose</a:t>
-            </a:r>
-            <a:r>
-              <a:rPr kumimoji="0" lang="en-US" altLang="en-US" sz="2800" b="0" i="0" u="none" strike="noStrike" cap="none" normalizeH="0" baseline="0" dirty="0">
-                <a:ln>
-                  <a:noFill/>
-                </a:ln>
-                <a:solidFill>
-                  <a:schemeClr val="tx1"/>
-                </a:solidFill>
-                <a:effectLst/>
-                <a:latin typeface="Arial" panose="020B0604020202020204" pitchFamily="34" charset="0"/>
-              </a:rPr>
-              <a:t>: Retrieve relevant documents using relationships in a graph or network.</a:t>
-            </a:r>
-          </a:p>
-          <a:p>
-            <a:pPr marL="0" marR="0" lvl="0" indent="0" algn="l" defTabSz="914400" rtl="0" eaLnBrk="0" fontAlgn="base" latinLnBrk="0" hangingPunct="0">
-              <a:lnSpc>
-                <a:spcPct val="100000"/>
-              </a:lnSpc>
-              <a:spcBef>
-                <a:spcPct val="0"/>
-              </a:spcBef>
-              <a:spcAft>
-                <a:spcPct val="0"/>
-              </a:spcAft>
-              <a:buClrTx/>
-              <a:buSzTx/>
-              <a:tabLst/>
-            </a:pPr>
-            <a:r>
-              <a:rPr kumimoji="0" lang="en-US" altLang="en-US" sz="2800" b="1" i="0" u="none" strike="noStrike" cap="none" normalizeH="0" baseline="0" dirty="0">
-                <a:ln>
-                  <a:noFill/>
-                </a:ln>
-                <a:solidFill>
-                  <a:schemeClr val="tx1"/>
-                </a:solidFill>
-                <a:effectLst/>
-                <a:latin typeface="Arial" panose="020B0604020202020204" pitchFamily="34" charset="0"/>
-              </a:rPr>
-              <a:t>Key Concept</a:t>
-            </a:r>
-            <a:r>
-              <a:rPr kumimoji="0" lang="en-US" altLang="en-US" sz="2800" b="0" i="0" u="none" strike="noStrike" cap="none" normalizeH="0" baseline="0" dirty="0">
-                <a:ln>
-                  <a:noFill/>
-                </a:ln>
-                <a:solidFill>
-                  <a:schemeClr val="tx1"/>
-                </a:solidFill>
-                <a:effectLst/>
-                <a:latin typeface="Arial" panose="020B0604020202020204" pitchFamily="34" charset="0"/>
-              </a:rPr>
-              <a:t>: Focuses on </a:t>
-            </a:r>
-            <a:r>
-              <a:rPr kumimoji="0" lang="en-US" altLang="en-US" sz="2800" b="0" i="1" u="none" strike="noStrike" cap="none" normalizeH="0" baseline="0" dirty="0">
-                <a:ln>
-                  <a:noFill/>
-                </a:ln>
-                <a:solidFill>
-                  <a:schemeClr val="tx1"/>
-                </a:solidFill>
-                <a:effectLst/>
-                <a:latin typeface="Arial" panose="020B0604020202020204" pitchFamily="34" charset="0"/>
-              </a:rPr>
-              <a:t>proximal nodes</a:t>
-            </a:r>
-            <a:r>
-              <a:rPr kumimoji="0" lang="en-US" altLang="en-US" sz="2800" b="0" i="0" u="none" strike="noStrike" cap="none" normalizeH="0" baseline="0" dirty="0">
-                <a:ln>
-                  <a:noFill/>
-                </a:ln>
-                <a:solidFill>
-                  <a:schemeClr val="tx1"/>
-                </a:solidFill>
-                <a:effectLst/>
-                <a:latin typeface="Arial" panose="020B0604020202020204" pitchFamily="34" charset="0"/>
-              </a:rPr>
-              <a:t> (intermediary nodes) instead of direct search.</a:t>
-            </a:r>
-          </a:p>
-          <a:p>
-            <a:pPr marL="0" marR="0" lvl="0" indent="0" algn="l" defTabSz="914400" rtl="0" eaLnBrk="0" fontAlgn="base" latinLnBrk="0" hangingPunct="0">
-              <a:lnSpc>
-                <a:spcPct val="100000"/>
-              </a:lnSpc>
-              <a:spcBef>
-                <a:spcPct val="0"/>
-              </a:spcBef>
-              <a:spcAft>
-                <a:spcPct val="0"/>
-              </a:spcAft>
-              <a:buClrTx/>
-              <a:buSzTx/>
-              <a:tabLst/>
-            </a:pPr>
-            <a:r>
-              <a:rPr kumimoji="0" lang="en-US" altLang="en-US" sz="2800" b="1" i="0" u="none" strike="noStrike" cap="none" normalizeH="0" baseline="0" dirty="0">
-                <a:ln>
-                  <a:noFill/>
-                </a:ln>
-                <a:solidFill>
-                  <a:schemeClr val="tx1"/>
-                </a:solidFill>
-                <a:effectLst/>
-                <a:latin typeface="Arial" panose="020B0604020202020204" pitchFamily="34" charset="0"/>
-              </a:rPr>
-              <a:t>How It Works</a:t>
-            </a:r>
-            <a:r>
-              <a:rPr kumimoji="0" lang="en-US" altLang="en-US" sz="2800" b="0" i="0" u="none" strike="noStrike" cap="none" normalizeH="0" baseline="0" dirty="0">
-                <a:ln>
-                  <a:noFill/>
-                </a:ln>
-                <a:solidFill>
-                  <a:schemeClr val="tx1"/>
-                </a:solidFill>
-                <a:effectLst/>
-                <a:latin typeface="Arial" panose="020B0604020202020204" pitchFamily="34" charset="0"/>
-              </a:rPr>
-              <a:t>:</a:t>
-            </a:r>
-          </a:p>
-          <a:p>
-            <a:pPr marL="914400" lvl="1" indent="-457200" eaLnBrk="0" fontAlgn="base" hangingPunct="0">
-              <a:spcBef>
-                <a:spcPct val="0"/>
-              </a:spcBef>
-              <a:spcAft>
-                <a:spcPct val="0"/>
-              </a:spcAft>
-              <a:buFont typeface="Arial" panose="020B0604020202020204" pitchFamily="34" charset="0"/>
-              <a:buChar char="•"/>
-            </a:pPr>
-            <a:r>
-              <a:rPr kumimoji="0" lang="en-US" altLang="en-US" sz="2800" b="0" i="0" u="none" strike="noStrike" cap="none" normalizeH="0" baseline="0" dirty="0">
-                <a:ln>
-                  <a:noFill/>
-                </a:ln>
-                <a:solidFill>
-                  <a:schemeClr val="tx1"/>
-                </a:solidFill>
-                <a:effectLst/>
-                <a:latin typeface="Arial" panose="020B0604020202020204" pitchFamily="34" charset="0"/>
-              </a:rPr>
-              <a:t>Represents data as nodes in a graph, with connections showing relationships.</a:t>
-            </a:r>
-          </a:p>
-          <a:p>
-            <a:pPr marL="914400" lvl="1" indent="-457200" eaLnBrk="0" fontAlgn="base" hangingPunct="0">
-              <a:spcBef>
-                <a:spcPct val="0"/>
-              </a:spcBef>
-              <a:spcAft>
-                <a:spcPct val="0"/>
-              </a:spcAft>
-              <a:buFont typeface="Arial" panose="020B0604020202020204" pitchFamily="34" charset="0"/>
-              <a:buChar char="•"/>
-            </a:pPr>
-            <a:r>
-              <a:rPr kumimoji="0" lang="en-US" altLang="en-US" sz="2800" b="0" i="0" u="none" strike="noStrike" cap="none" normalizeH="0" baseline="0" dirty="0">
-                <a:ln>
-                  <a:noFill/>
-                </a:ln>
-                <a:solidFill>
-                  <a:schemeClr val="tx1"/>
-                </a:solidFill>
-                <a:effectLst/>
-                <a:latin typeface="Arial" panose="020B0604020202020204" pitchFamily="34" charset="0"/>
-              </a:rPr>
-              <a:t>Identifies related nodes (proximal nodes) linked to desired information.</a:t>
-            </a:r>
-          </a:p>
-          <a:p>
-            <a:pPr marL="914400" lvl="1" indent="-457200" eaLnBrk="0" fontAlgn="base" hangingPunct="0">
-              <a:spcBef>
-                <a:spcPct val="0"/>
-              </a:spcBef>
-              <a:spcAft>
-                <a:spcPct val="0"/>
-              </a:spcAft>
-              <a:buFont typeface="Arial" panose="020B0604020202020204" pitchFamily="34" charset="0"/>
-              <a:buChar char="•"/>
-            </a:pPr>
-            <a:r>
-              <a:rPr kumimoji="0" lang="en-US" altLang="en-US" sz="2800" b="0" i="0" u="none" strike="noStrike" cap="none" normalizeH="0" baseline="0" dirty="0">
-                <a:ln>
-                  <a:noFill/>
-                </a:ln>
-                <a:solidFill>
-                  <a:schemeClr val="tx1"/>
-                </a:solidFill>
-                <a:effectLst/>
-                <a:latin typeface="Arial" panose="020B0604020202020204" pitchFamily="34" charset="0"/>
-              </a:rPr>
-              <a:t>Explores the network to retrieve documents connected to these nodes.</a:t>
+              <a:t>Example Use Case</a:t>
+            </a:r>
+          </a:p>
+        </p:txBody>
+      </p:sp>
+      <p:sp>
+        <p:nvSpPr>
+          <p:cNvPr id="3" name="Text Placeholder 2">
+            <a:extLst>
+              <a:ext uri="{FF2B5EF4-FFF2-40B4-BE49-F238E27FC236}">
+                <a16:creationId xmlns:a16="http://schemas.microsoft.com/office/drawing/2014/main" id="{A34EFD3C-B9B4-9B3F-5ED7-52FEC7AEEDF4}"/>
+              </a:ext>
+            </a:extLst>
+          </p:cNvPr>
+          <p:cNvSpPr>
+            <a:spLocks noGrp="1"/>
+          </p:cNvSpPr>
+          <p:nvPr>
+            <p:ph type="body" idx="1"/>
+          </p:nvPr>
+        </p:nvSpPr>
+        <p:spPr/>
+        <p:txBody>
+          <a:bodyPr/>
+          <a:lstStyle/>
+          <a:p>
+            <a:r>
+              <a:rPr lang="en-US"/>
+              <a:t>1. Uploading Documents: User uploads .txt files.</a:t>
+            </a:r>
+          </a:p>
+          <a:p>
+            <a:r>
+              <a:rPr lang="en-US"/>
+              <a:t>2. Perform Search: User enters a query and selects a search model.</a:t>
+            </a:r>
+          </a:p>
+          <a:p>
+            <a:r>
+              <a:rPr lang="en-US"/>
+              <a:t>3. Retrieve Results: Results are displayed based on relevance.</a:t>
             </a:r>
           </a:p>
         </p:txBody>
@@ -3944,111 +3977,7 @@
     </p:spTree>
     <p:extLst>
       <p:ext uri="{BB962C8B-B14F-4D97-AF65-F5344CB8AC3E}">
-        <p14:creationId xmlns:p14="http://schemas.microsoft.com/office/powerpoint/2010/main" val="1120986462"/>
-      </p:ext>
-    </p:extLst>
-  </p:cSld>
-  <p:clrMapOvr>
-    <a:masterClrMapping/>
-  </p:clrMapOvr>
-</p:sld>
-</file>
-
-<file path=ppt/slides/slide11.xml><?xml version="1.0" encoding="utf-8"?>
-<p:sld xmlns:a="http://schemas.openxmlformats.org/drawingml/2006/main" xmlns:r="http://schemas.openxmlformats.org/officeDocument/2006/relationships" xmlns:p="http://schemas.openxmlformats.org/presentationml/2006/main">
-  <p:cSld>
-    <p:spTree>
-      <p:nvGrpSpPr>
-        <p:cNvPr id="1" name="">
-          <a:extLst>
-            <a:ext uri="{FF2B5EF4-FFF2-40B4-BE49-F238E27FC236}">
-              <a16:creationId xmlns:a16="http://schemas.microsoft.com/office/drawing/2014/main" id="{29BAC40C-C098-49DF-4C93-908D980ECFF1}"/>
-            </a:ext>
-          </a:extLst>
-        </p:cNvPr>
-        <p:cNvGrpSpPr/>
-        <p:nvPr/>
-      </p:nvGrpSpPr>
-      <p:grpSpPr>
-        <a:xfrm>
-          <a:off x="0" y="0"/>
-          <a:ext cx="0" cy="0"/>
-          <a:chOff x="0" y="0"/>
-          <a:chExt cx="0" cy="0"/>
-        </a:xfrm>
-      </p:grpSpPr>
-      <p:sp>
-        <p:nvSpPr>
-          <p:cNvPr id="2" name="Title 1">
-            <a:extLst>
-              <a:ext uri="{FF2B5EF4-FFF2-40B4-BE49-F238E27FC236}">
-                <a16:creationId xmlns:a16="http://schemas.microsoft.com/office/drawing/2014/main" id="{D33CCE6D-7F98-438E-13CD-23881D27218F}"/>
-              </a:ext>
-            </a:extLst>
-          </p:cNvPr>
-          <p:cNvSpPr>
-            <a:spLocks noGrp="1"/>
-          </p:cNvSpPr>
-          <p:nvPr>
-            <p:ph type="title"/>
-          </p:nvPr>
-        </p:nvSpPr>
-        <p:spPr/>
-        <p:txBody>
-          <a:bodyPr/>
-          <a:lstStyle/>
-          <a:p>
-            <a:r>
-              <a:rPr lang="en-US" dirty="0"/>
-              <a:t>Proximal Nodes Model - Working</a:t>
-            </a:r>
-          </a:p>
-        </p:txBody>
-      </p:sp>
-      <p:sp>
-        <p:nvSpPr>
-          <p:cNvPr id="3" name="Text Placeholder 2">
-            <a:extLst>
-              <a:ext uri="{FF2B5EF4-FFF2-40B4-BE49-F238E27FC236}">
-                <a16:creationId xmlns:a16="http://schemas.microsoft.com/office/drawing/2014/main" id="{F935A37B-29F1-52B9-43AE-063441384EBF}"/>
-              </a:ext>
-            </a:extLst>
-          </p:cNvPr>
-          <p:cNvSpPr>
-            <a:spLocks noGrp="1"/>
-          </p:cNvSpPr>
-          <p:nvPr>
-            <p:ph type="body" idx="1"/>
-          </p:nvPr>
-        </p:nvSpPr>
-        <p:spPr/>
-        <p:txBody>
-          <a:bodyPr/>
-          <a:lstStyle/>
-          <a:p>
-            <a:r>
-              <a:rPr lang="en-US" dirty="0"/>
-              <a:t>Use a graph of related terms.</a:t>
-            </a:r>
-          </a:p>
-          <a:p>
-            <a:r>
-              <a:rPr lang="en-US" dirty="0"/>
-              <a:t>Search for terms related to the query.</a:t>
-            </a:r>
-          </a:p>
-          <a:p>
-            <a:r>
-              <a:rPr lang="en-US" dirty="0"/>
-              <a:t>Retrieve and rank documents connected to related terms.</a:t>
-            </a:r>
-          </a:p>
-        </p:txBody>
-      </p:sp>
-    </p:spTree>
-    <p:extLst>
-      <p:ext uri="{BB962C8B-B14F-4D97-AF65-F5344CB8AC3E}">
-        <p14:creationId xmlns:p14="http://schemas.microsoft.com/office/powerpoint/2010/main" val="2713228731"/>
+        <p14:creationId xmlns:p14="http://schemas.microsoft.com/office/powerpoint/2010/main" val="1970162241"/>
       </p:ext>
     </p:extLst>
   </p:cSld>
@@ -4080,7 +4009,7 @@
           <p:cNvPr id="2" name="Title 1">
             <a:extLst>
               <a:ext uri="{FF2B5EF4-FFF2-40B4-BE49-F238E27FC236}">
-                <a16:creationId xmlns:a16="http://schemas.microsoft.com/office/drawing/2014/main" id="{37E6096E-EF5E-50AF-DB40-F154E65A5406}"/>
+                <a16:creationId xmlns:a16="http://schemas.microsoft.com/office/drawing/2014/main" id="{48376405-1F3B-397F-2815-8CE4464DF6E5}"/>
               </a:ext>
             </a:extLst>
           </p:cNvPr>
@@ -4098,7 +4027,7 @@
           <a:p>
             <a:r>
               <a:rPr lang="en-US"/>
-              <a:t>Challenges Faced</a:t>
+              <a:t>Technical Details</a:t>
             </a:r>
           </a:p>
         </p:txBody>
@@ -4108,7 +4037,7 @@
           <p:cNvPr id="3" name="Text Placeholder 2">
             <a:extLst>
               <a:ext uri="{FF2B5EF4-FFF2-40B4-BE49-F238E27FC236}">
-                <a16:creationId xmlns:a16="http://schemas.microsoft.com/office/drawing/2014/main" id="{F4AD0BFB-6585-3E89-AE5D-9A1F7DD364BD}"/>
+                <a16:creationId xmlns:a16="http://schemas.microsoft.com/office/drawing/2014/main" id="{EB93F1C4-B023-3E83-6DC2-E4F416CB6FFB}"/>
               </a:ext>
             </a:extLst>
           </p:cNvPr>
@@ -4124,21 +4053,39 @@
           <a:bodyPr/>
           <a:lstStyle/>
           <a:p>
-            <a:r>
-              <a:rPr lang="en-US" dirty="0"/>
-              <a:t>Designing an efficient graph for proximal nodes.</a:t>
-            </a:r>
-          </a:p>
-          <a:p>
-            <a:r>
-              <a:rPr lang="en-US" dirty="0"/>
-              <a:t>Balancing accuracy and performance in search.</a:t>
-            </a:r>
-          </a:p>
-          <a:p>
-            <a:r>
-              <a:rPr lang="en-US" dirty="0"/>
-              <a:t>Implementing ranking for multiple models.</a:t>
+            <a:pPr marL="0" indent="0">
+              <a:buNone/>
+            </a:pPr>
+            <a:r>
+              <a:rPr lang="en-US"/>
+              <a:t>• Programming Language: Python</a:t>
+            </a:r>
+          </a:p>
+          <a:p>
+            <a:pPr marL="0" indent="0">
+              <a:buNone/>
+            </a:pPr>
+            <a:r>
+              <a:rPr lang="en-US"/>
+              <a:t>• Framework: Django</a:t>
+            </a:r>
+          </a:p>
+          <a:p>
+            <a:pPr marL="0" indent="0">
+              <a:buNone/>
+            </a:pPr>
+            <a:r>
+              <a:rPr lang="en-US"/>
+              <a:t>• Search Algorithms: BIM, Non-Overlapped Lists, Proximal Nodes</a:t>
+            </a:r>
+          </a:p>
+          <a:p>
+            <a:pPr marL="0" indent="0">
+              <a:buNone/>
+            </a:pPr>
+            <a:r>
+              <a:rPr lang="en-US"/>
+              <a:t>• Data Storage: Files in documents/ directory, indexed in a dictionary.</a:t>
             </a:r>
           </a:p>
         </p:txBody>
@@ -4146,7 +4093,7 @@
     </p:spTree>
     <p:extLst>
       <p:ext uri="{BB962C8B-B14F-4D97-AF65-F5344CB8AC3E}">
-        <p14:creationId xmlns:p14="http://schemas.microsoft.com/office/powerpoint/2010/main" val="3293664706"/>
+        <p14:creationId xmlns:p14="http://schemas.microsoft.com/office/powerpoint/2010/main" val="868980539"/>
       </p:ext>
     </p:extLst>
   </p:cSld>
@@ -4178,7 +4125,7 @@
           <p:cNvPr id="2" name="Title 1">
             <a:extLst>
               <a:ext uri="{FF2B5EF4-FFF2-40B4-BE49-F238E27FC236}">
-                <a16:creationId xmlns:a16="http://schemas.microsoft.com/office/drawing/2014/main" id="{E8A38336-E268-1710-F38D-BF4DD3E97DCA}"/>
+                <a16:creationId xmlns:a16="http://schemas.microsoft.com/office/drawing/2014/main" id="{88EA83A0-152D-7E99-C183-C6505B703145}"/>
               </a:ext>
             </a:extLst>
           </p:cNvPr>
@@ -4196,7 +4143,7 @@
           <a:p>
             <a:r>
               <a:rPr lang="en-US"/>
-              <a:t>Results</a:t>
+              <a:t>Future Improvements</a:t>
             </a:r>
           </a:p>
         </p:txBody>
@@ -4206,7 +4153,7 @@
           <p:cNvPr id="3" name="Text Placeholder 2">
             <a:extLst>
               <a:ext uri="{FF2B5EF4-FFF2-40B4-BE49-F238E27FC236}">
-                <a16:creationId xmlns:a16="http://schemas.microsoft.com/office/drawing/2014/main" id="{67F6430A-E9E3-5098-6052-22F76E823A65}"/>
+                <a16:creationId xmlns:a16="http://schemas.microsoft.com/office/drawing/2014/main" id="{E383D465-6547-6786-4EE3-31E671114A98}"/>
               </a:ext>
             </a:extLst>
           </p:cNvPr>
@@ -4222,36 +4169,30 @@
           <a:bodyPr/>
           <a:lstStyle/>
           <a:p>
-            <a:r>
-              <a:rPr lang="en-US" dirty="0"/>
-              <a:t>Documents retrieved for each model:</a:t>
-            </a:r>
-          </a:p>
-          <a:p>
-            <a:pPr lvl="1"/>
-            <a:r>
-              <a:rPr lang="en-US" dirty="0"/>
-              <a:t>BIM: Ranked by term matching.</a:t>
-            </a:r>
-          </a:p>
-          <a:p>
-            <a:pPr lvl="1"/>
-            <a:r>
-              <a:rPr lang="en-US" dirty="0"/>
-              <a:t>Non-Overlapped: Flexible and versatile.</a:t>
-            </a:r>
-          </a:p>
-          <a:p>
-            <a:pPr lvl="1"/>
-            <a:r>
-              <a:rPr lang="en-US" dirty="0"/>
-              <a:t>Proximal Nodes: Graph-based ranking.</a:t>
-            </a:r>
-          </a:p>
-          <a:p>
-            <a:r>
-              <a:rPr lang="en-US" dirty="0"/>
-              <a:t>Improved retrieval accuracy.</a:t>
+            <a:pPr marL="0" indent="0">
+              <a:buNone/>
+            </a:pPr>
+            <a:r>
+              <a:rPr lang="en-US"/>
+              <a:t>• Integrate machine learning models for enhanced semantic search.</a:t>
+            </a:r>
+          </a:p>
+          <a:p>
+            <a:pPr marL="0" indent="0">
+              <a:buNone/>
+            </a:pPr>
+            <a:r>
+              <a:rPr lang="en-US"/>
+              <a:t>• Add support for additional file formats (PDF, Word).</a:t>
+            </a:r>
+          </a:p>
+          <a:p>
+            <a:pPr marL="0" indent="0">
+              <a:buNone/>
+            </a:pPr>
+            <a:r>
+              <a:rPr lang="en-US"/>
+              <a:t>• User-friendly front-end with advanced filters and pagination.</a:t>
             </a:r>
           </a:p>
         </p:txBody>
@@ -4259,200 +4200,7 @@
     </p:spTree>
     <p:extLst>
       <p:ext uri="{BB962C8B-B14F-4D97-AF65-F5344CB8AC3E}">
-        <p14:creationId xmlns:p14="http://schemas.microsoft.com/office/powerpoint/2010/main" val="584626467"/>
-      </p:ext>
-    </p:extLst>
-  </p:cSld>
-  <p:clrMapOvr>
-    <a:masterClrMapping/>
-  </p:clrMapOvr>
-</p:sld>
-</file>
-
-<file path=ppt/slides/slide14.xml><?xml version="1.0" encoding="utf-8"?>
-<p:sld xmlns:a="http://schemas.openxmlformats.org/drawingml/2006/main" xmlns:r="http://schemas.openxmlformats.org/officeDocument/2006/relationships" xmlns:p="http://schemas.openxmlformats.org/presentationml/2006/main">
-  <p:cSld>
-    <p:spTree>
-      <p:nvGrpSpPr>
-        <p:cNvPr id="1" name=""/>
-        <p:cNvGrpSpPr/>
-        <p:nvPr/>
-      </p:nvGrpSpPr>
-      <p:grpSpPr>
-        <a:xfrm>
-          <a:off x="0" y="0"/>
-          <a:ext cx="0" cy="0"/>
-          <a:chOff x="0" y="0"/>
-          <a:chExt cx="0" cy="0"/>
-        </a:xfrm>
-      </p:grpSpPr>
-      <p:sp>
-        <p:nvSpPr>
-          <p:cNvPr id="2" name="Title 1">
-            <a:extLst>
-              <a:ext uri="{FF2B5EF4-FFF2-40B4-BE49-F238E27FC236}">
-                <a16:creationId xmlns:a16="http://schemas.microsoft.com/office/drawing/2014/main" id="{FBC3A6DE-529A-90C2-CB8D-020D1A4A13CB}"/>
-              </a:ext>
-            </a:extLst>
-          </p:cNvPr>
-          <p:cNvSpPr>
-            <a:spLocks noGrp="1"/>
-          </p:cNvSpPr>
-          <p:nvPr>
-            <p:ph type="title"/>
-          </p:nvPr>
-        </p:nvSpPr>
-        <p:spPr/>
-        <p:txBody>
-          <a:bodyPr/>
-          <a:lstStyle/>
-          <a:p>
-            <a:r>
-              <a:rPr lang="en-US" dirty="0"/>
-              <a:t>Conclusion</a:t>
-            </a:r>
-          </a:p>
-        </p:txBody>
-      </p:sp>
-      <p:sp>
-        <p:nvSpPr>
-          <p:cNvPr id="3" name="Text Placeholder 2">
-            <a:extLst>
-              <a:ext uri="{FF2B5EF4-FFF2-40B4-BE49-F238E27FC236}">
-                <a16:creationId xmlns:a16="http://schemas.microsoft.com/office/drawing/2014/main" id="{333064FF-DDF9-1E12-443D-2E7F67B4DD0D}"/>
-              </a:ext>
-            </a:extLst>
-          </p:cNvPr>
-          <p:cNvSpPr>
-            <a:spLocks noGrp="1"/>
-          </p:cNvSpPr>
-          <p:nvPr>
-            <p:ph type="body" idx="1"/>
-          </p:nvPr>
-        </p:nvSpPr>
-        <p:spPr/>
-        <p:txBody>
-          <a:bodyPr/>
-          <a:lstStyle/>
-          <a:p>
-            <a:r>
-              <a:rPr lang="en-US" dirty="0"/>
-              <a:t>The implemented models provide different approaches for retrieving documents:</a:t>
-            </a:r>
-          </a:p>
-          <a:p>
-            <a:pPr lvl="1"/>
-            <a:r>
-              <a:rPr lang="en-US" dirty="0"/>
-              <a:t>BIM for exact matches.</a:t>
-            </a:r>
-          </a:p>
-          <a:p>
-            <a:pPr lvl="1"/>
-            <a:r>
-              <a:rPr lang="en-US" dirty="0"/>
-              <a:t>Non-Overlapped for flexibility.</a:t>
-            </a:r>
-          </a:p>
-          <a:p>
-            <a:pPr lvl="1"/>
-            <a:r>
-              <a:rPr lang="en-US" dirty="0"/>
-              <a:t>Proximal Nodes for contextual results.</a:t>
-            </a:r>
-          </a:p>
-        </p:txBody>
-      </p:sp>
-    </p:spTree>
-    <p:extLst>
-      <p:ext uri="{BB962C8B-B14F-4D97-AF65-F5344CB8AC3E}">
-        <p14:creationId xmlns:p14="http://schemas.microsoft.com/office/powerpoint/2010/main" val="1015393636"/>
-      </p:ext>
-    </p:extLst>
-  </p:cSld>
-  <p:clrMapOvr>
-    <a:masterClrMapping/>
-  </p:clrMapOvr>
-</p:sld>
-</file>
-
-<file path=ppt/slides/slide15.xml><?xml version="1.0" encoding="utf-8"?>
-<p:sld xmlns:a="http://schemas.openxmlformats.org/drawingml/2006/main" xmlns:r="http://schemas.openxmlformats.org/officeDocument/2006/relationships" xmlns:p="http://schemas.openxmlformats.org/presentationml/2006/main">
-  <p:cSld>
-    <p:spTree>
-      <p:nvGrpSpPr>
-        <p:cNvPr id="1" name=""/>
-        <p:cNvGrpSpPr/>
-        <p:nvPr/>
-      </p:nvGrpSpPr>
-      <p:grpSpPr>
-        <a:xfrm>
-          <a:off x="0" y="0"/>
-          <a:ext cx="0" cy="0"/>
-          <a:chOff x="0" y="0"/>
-          <a:chExt cx="0" cy="0"/>
-        </a:xfrm>
-      </p:grpSpPr>
-      <p:sp>
-        <p:nvSpPr>
-          <p:cNvPr id="2" name="Title 1">
-            <a:extLst>
-              <a:ext uri="{FF2B5EF4-FFF2-40B4-BE49-F238E27FC236}">
-                <a16:creationId xmlns:a16="http://schemas.microsoft.com/office/drawing/2014/main" id="{0CC3632A-967D-6AAB-A60E-6F641F7876C9}"/>
-              </a:ext>
-            </a:extLst>
-          </p:cNvPr>
-          <p:cNvSpPr>
-            <a:spLocks noGrp="1"/>
-          </p:cNvSpPr>
-          <p:nvPr>
-            <p:ph type="ctrTitle"/>
-          </p:nvPr>
-        </p:nvSpPr>
-        <p:spPr/>
-        <p:txBody>
-          <a:bodyPr/>
-          <a:lstStyle/>
-          <a:p>
-            <a:r>
-              <a:rPr lang="en-US"/>
-              <a:t>Questions?</a:t>
-            </a:r>
-          </a:p>
-        </p:txBody>
-      </p:sp>
-      <p:sp>
-        <p:nvSpPr>
-          <p:cNvPr id="3" name="Subtitle 2">
-            <a:extLst>
-              <a:ext uri="{FF2B5EF4-FFF2-40B4-BE49-F238E27FC236}">
-                <a16:creationId xmlns:a16="http://schemas.microsoft.com/office/drawing/2014/main" id="{F07D544A-411E-F8F8-D075-0DB74BA4C480}"/>
-              </a:ext>
-            </a:extLst>
-          </p:cNvPr>
-          <p:cNvSpPr>
-            <a:spLocks noGrp="1"/>
-          </p:cNvSpPr>
-          <p:nvPr>
-            <p:ph type="subTitle" idx="1"/>
-          </p:nvPr>
-        </p:nvSpPr>
-        <p:spPr/>
-        <p:txBody>
-          <a:bodyPr/>
-          <a:lstStyle/>
-          <a:p>
-            <a:r>
-              <a:rPr lang="en-US"/>
-              <a:t>Thank you for your attention!</a:t>
-            </a:r>
-          </a:p>
-        </p:txBody>
-      </p:sp>
-    </p:spTree>
-    <p:extLst>
-      <p:ext uri="{BB962C8B-B14F-4D97-AF65-F5344CB8AC3E}">
-        <p14:creationId xmlns:p14="http://schemas.microsoft.com/office/powerpoint/2010/main" val="2024726717"/>
+        <p14:creationId xmlns:p14="http://schemas.microsoft.com/office/powerpoint/2010/main" val="3476970758"/>
       </p:ext>
     </p:extLst>
   </p:cSld>
@@ -4484,7 +4232,7 @@
           <p:cNvPr id="2" name="Title 1">
             <a:extLst>
               <a:ext uri="{FF2B5EF4-FFF2-40B4-BE49-F238E27FC236}">
-                <a16:creationId xmlns:a16="http://schemas.microsoft.com/office/drawing/2014/main" id="{C0E343E4-1C46-C14E-216D-DAEE6C2B5735}"/>
+                <a16:creationId xmlns:a16="http://schemas.microsoft.com/office/drawing/2014/main" id="{B1384C40-C8E6-23BD-2D14-B19A85104672}"/>
               </a:ext>
             </a:extLst>
           </p:cNvPr>
@@ -4502,7 +4250,7 @@
           <a:p>
             <a:r>
               <a:rPr lang="en-US"/>
-              <a:t>Goal</a:t>
+              <a:t>Overview</a:t>
             </a:r>
           </a:p>
         </p:txBody>
@@ -4512,7 +4260,7 @@
           <p:cNvPr id="3" name="Text Placeholder 2">
             <a:extLst>
               <a:ext uri="{FF2B5EF4-FFF2-40B4-BE49-F238E27FC236}">
-                <a16:creationId xmlns:a16="http://schemas.microsoft.com/office/drawing/2014/main" id="{6D4F2187-8598-EF7A-8D29-92B956164851}"/>
+                <a16:creationId xmlns:a16="http://schemas.microsoft.com/office/drawing/2014/main" id="{6E39EEC3-042D-D0CA-F20B-A9396C7C81C2}"/>
               </a:ext>
             </a:extLst>
           </p:cNvPr>
@@ -4529,26 +4277,8 @@
           <a:lstStyle/>
           <a:p>
             <a:r>
-              <a:rPr lang="en-US" dirty="0"/>
-              <a:t>The goal is to retrieve documents based on user queries using three models: </a:t>
-            </a:r>
-          </a:p>
-          <a:p>
-            <a:r>
-              <a:rPr lang="en-US" dirty="0"/>
-              <a:t>Binary Independence Model (BIM) </a:t>
-            </a:r>
-          </a:p>
-          <a:p>
-            <a:r>
-              <a:rPr lang="en-US" dirty="0"/>
-              <a:t>Non-Overlapped List Model</a:t>
-            </a:r>
-          </a:p>
-          <a:p>
-            <a:r>
-              <a:rPr lang="en-US" dirty="0"/>
-              <a:t>Proximal Nodes Model</a:t>
+              <a:rPr lang="en-US"/>
+              <a:t>The Document Search Engine is a Django-based application built using Python. It enables users to upload and process documents, apply advanced search algorithms, and retrieve results ranked by relevance.</a:t>
             </a:r>
           </a:p>
         </p:txBody>
@@ -4556,7 +4286,7 @@
     </p:spTree>
     <p:extLst>
       <p:ext uri="{BB962C8B-B14F-4D97-AF65-F5344CB8AC3E}">
-        <p14:creationId xmlns:p14="http://schemas.microsoft.com/office/powerpoint/2010/main" val="1177164305"/>
+        <p14:creationId xmlns:p14="http://schemas.microsoft.com/office/powerpoint/2010/main" val="454749311"/>
       </p:ext>
     </p:extLst>
   </p:cSld>
@@ -4588,7 +4318,7 @@
           <p:cNvPr id="2" name="Title 1">
             <a:extLst>
               <a:ext uri="{FF2B5EF4-FFF2-40B4-BE49-F238E27FC236}">
-                <a16:creationId xmlns:a16="http://schemas.microsoft.com/office/drawing/2014/main" id="{0B162633-96D1-4918-1487-8518CBF20FBE}"/>
+                <a16:creationId xmlns:a16="http://schemas.microsoft.com/office/drawing/2014/main" id="{26D278B3-B013-F42B-15C0-D84D72BBA913}"/>
               </a:ext>
             </a:extLst>
           </p:cNvPr>
@@ -4606,7 +4336,7 @@
           <a:p>
             <a:r>
               <a:rPr lang="en-US"/>
-              <a:t>Objective</a:t>
+              <a:t>Core Features</a:t>
             </a:r>
           </a:p>
         </p:txBody>
@@ -4616,7 +4346,7 @@
           <p:cNvPr id="3" name="Text Placeholder 2">
             <a:extLst>
               <a:ext uri="{FF2B5EF4-FFF2-40B4-BE49-F238E27FC236}">
-                <a16:creationId xmlns:a16="http://schemas.microsoft.com/office/drawing/2014/main" id="{A220C937-54D4-EC89-3D04-F7A8D0846391}"/>
+                <a16:creationId xmlns:a16="http://schemas.microsoft.com/office/drawing/2014/main" id="{189CF2D2-5404-1A78-39D0-E0AFAFA3E7AA}"/>
               </a:ext>
             </a:extLst>
           </p:cNvPr>
@@ -4632,9 +4362,30 @@
           <a:bodyPr/>
           <a:lstStyle/>
           <a:p>
-            <a:r>
-              <a:rPr lang="en-US"/>
-              <a:t>To implement efficient search techniques that help users find relevant documents quickly and accurately.</a:t>
+            <a:pPr marL="0" indent="0">
+              <a:buNone/>
+            </a:pPr>
+            <a:r>
+              <a:rPr lang="en-US" dirty="0"/>
+              <a:t>• File Uploading: Upload .txt files and process them immediately.</a:t>
+            </a:r>
+          </a:p>
+          <a:p>
+            <a:pPr marL="0" indent="0">
+              <a:buNone/>
+            </a:pPr>
+            <a:r>
+              <a:rPr lang="en-US" dirty="0"/>
+              <a:t>• Document Indexing: Preprocess documents and apply search models.</a:t>
+            </a:r>
+          </a:p>
+          <a:p>
+            <a:pPr marL="0" indent="0">
+              <a:buNone/>
+            </a:pPr>
+            <a:r>
+              <a:rPr lang="en-US" dirty="0"/>
+              <a:t>• Search Functionality: Search by keywords or phrases and retrieve ranked results.</a:t>
             </a:r>
           </a:p>
         </p:txBody>
@@ -4642,7 +4393,7 @@
     </p:spTree>
     <p:extLst>
       <p:ext uri="{BB962C8B-B14F-4D97-AF65-F5344CB8AC3E}">
-        <p14:creationId xmlns:p14="http://schemas.microsoft.com/office/powerpoint/2010/main" val="3806850497"/>
+        <p14:creationId xmlns:p14="http://schemas.microsoft.com/office/powerpoint/2010/main" val="3045569953"/>
       </p:ext>
     </p:extLst>
   </p:cSld>
@@ -4674,7 +4425,7 @@
           <p:cNvPr id="2" name="Title 1">
             <a:extLst>
               <a:ext uri="{FF2B5EF4-FFF2-40B4-BE49-F238E27FC236}">
-                <a16:creationId xmlns:a16="http://schemas.microsoft.com/office/drawing/2014/main" id="{03882C9D-5BB5-29FF-5F6B-8629BFEB5D96}"/>
+                <a16:creationId xmlns:a16="http://schemas.microsoft.com/office/drawing/2014/main" id="{58D239BD-2891-AFA6-9B45-4DD09B50BA27}"/>
               </a:ext>
             </a:extLst>
           </p:cNvPr>
@@ -4692,7 +4443,7 @@
           <a:p>
             <a:r>
               <a:rPr lang="en-US"/>
-              <a:t>Technologies Used</a:t>
+              <a:t>Search Models</a:t>
             </a:r>
           </a:p>
         </p:txBody>
@@ -4702,7 +4453,7 @@
           <p:cNvPr id="3" name="Text Placeholder 2">
             <a:extLst>
               <a:ext uri="{FF2B5EF4-FFF2-40B4-BE49-F238E27FC236}">
-                <a16:creationId xmlns:a16="http://schemas.microsoft.com/office/drawing/2014/main" id="{7AAF8AC7-EE7F-8D28-32D2-54ED73DF8EAE}"/>
+                <a16:creationId xmlns:a16="http://schemas.microsoft.com/office/drawing/2014/main" id="{99878178-8C76-83CC-3ECC-D85DCD495B44}"/>
               </a:ext>
             </a:extLst>
           </p:cNvPr>
@@ -4713,31 +4464,35 @@
             <p:ph type="body" idx="1"/>
           </p:nvPr>
         </p:nvSpPr>
-        <p:spPr>
-          <a:xfrm>
-            <a:off x="838200" y="1831975"/>
-            <a:ext cx="10515600" cy="4351338"/>
-          </a:xfrm>
-        </p:spPr>
-        <p:txBody>
-          <a:bodyPr/>
-          <a:lstStyle/>
-          <a:p>
+        <p:spPr/>
+        <p:txBody>
+          <a:bodyPr/>
+          <a:lstStyle/>
+          <a:p>
+            <a:pPr marL="0" indent="0">
+              <a:buNone/>
+            </a:pPr>
             <a:r>
               <a:rPr lang="en-US" dirty="0"/>
-              <a:t>Python </a:t>
-            </a:r>
-          </a:p>
-          <a:p>
+              <a:t>• Binary Independence Model (BIM): Scores documents based on query overlap.</a:t>
+            </a:r>
+          </a:p>
+          <a:p>
+            <a:pPr marL="0" indent="0">
+              <a:buNone/>
+            </a:pPr>
             <a:r>
               <a:rPr lang="en-US" dirty="0"/>
-              <a:t>Document Database (Dictionary-based Simulation) </a:t>
-            </a:r>
-          </a:p>
-          <a:p>
+              <a:t>• Non-Overlapped List Model: Organizes documents by individual query terms.</a:t>
+            </a:r>
+          </a:p>
+          <a:p>
+            <a:pPr marL="0" indent="0">
+              <a:buNone/>
+            </a:pPr>
             <a:r>
               <a:rPr lang="en-US" dirty="0"/>
-              <a:t>Graph Algorithms for Proximal Nodes</a:t>
+              <a:t>• Proximal Nodes Model: Uses semantic relationships to retrieve documents.</a:t>
             </a:r>
           </a:p>
         </p:txBody>
@@ -4745,7 +4500,7 @@
     </p:spTree>
     <p:extLst>
       <p:ext uri="{BB962C8B-B14F-4D97-AF65-F5344CB8AC3E}">
-        <p14:creationId xmlns:p14="http://schemas.microsoft.com/office/powerpoint/2010/main" val="2852374089"/>
+        <p14:creationId xmlns:p14="http://schemas.microsoft.com/office/powerpoint/2010/main" val="533963609"/>
       </p:ext>
     </p:extLst>
   </p:cSld>
@@ -4777,7 +4532,7 @@
           <p:cNvPr id="2" name="Title 1">
             <a:extLst>
               <a:ext uri="{FF2B5EF4-FFF2-40B4-BE49-F238E27FC236}">
-                <a16:creationId xmlns:a16="http://schemas.microsoft.com/office/drawing/2014/main" id="{6029125C-CF2C-9E78-AAEE-25886B547C1B}"/>
+                <a16:creationId xmlns:a16="http://schemas.microsoft.com/office/drawing/2014/main" id="{7B5AAA2A-A082-A921-196E-6B3484D7F476}"/>
               </a:ext>
             </a:extLst>
           </p:cNvPr>
@@ -4795,7 +4550,7 @@
           <a:p>
             <a:r>
               <a:rPr lang="en-US"/>
-              <a:t>Process Overview</a:t>
+              <a:t>Binary Independence Model (BIM)</a:t>
             </a:r>
           </a:p>
         </p:txBody>
@@ -4805,7 +4560,7 @@
           <p:cNvPr id="3" name="Text Placeholder 2">
             <a:extLst>
               <a:ext uri="{FF2B5EF4-FFF2-40B4-BE49-F238E27FC236}">
-                <a16:creationId xmlns:a16="http://schemas.microsoft.com/office/drawing/2014/main" id="{96C7DA0C-F6CA-252D-37F1-91939665287A}"/>
+                <a16:creationId xmlns:a16="http://schemas.microsoft.com/office/drawing/2014/main" id="{04BCBCE2-789B-1C59-233F-D89201A09A1C}"/>
               </a:ext>
             </a:extLst>
           </p:cNvPr>
@@ -4821,48 +4576,30 @@
           <a:bodyPr/>
           <a:lstStyle/>
           <a:p>
-            <a:r>
-              <a:rPr lang="en-US" dirty="0"/>
-              <a:t>Preprocessing Documents</a:t>
-            </a:r>
-          </a:p>
-          <a:p>
-            <a:r>
-              <a:rPr lang="en-US" dirty="0"/>
-              <a:t>Applying Retrieval Models:</a:t>
-            </a:r>
-          </a:p>
-          <a:p>
-            <a:pPr lvl="1"/>
-            <a:r>
-              <a:rPr lang="en-US" dirty="0"/>
-              <a:t> BIM</a:t>
-            </a:r>
-          </a:p>
-          <a:p>
-            <a:pPr lvl="1"/>
-            <a:r>
-              <a:rPr lang="en-US" dirty="0"/>
-              <a:t>Non-Overlapped List</a:t>
-            </a:r>
-          </a:p>
-          <a:p>
-            <a:pPr lvl="1"/>
-            <a:r>
-              <a:rPr lang="en-US" dirty="0"/>
-              <a:t>Proximal Nodes</a:t>
-            </a:r>
-          </a:p>
-          <a:p>
-            <a:r>
-              <a:rPr lang="en-US" dirty="0"/>
-              <a:t>Returning Results</a:t>
-            </a:r>
-          </a:p>
-          <a:p>
-            <a:r>
-              <a:rPr lang="en-US" dirty="0"/>
-              <a:t>Ranking Relevant Documents</a:t>
+            <a:pPr marL="0" indent="0">
+              <a:buNone/>
+            </a:pPr>
+            <a:r>
+              <a:rPr lang="en-US"/>
+              <a:t>• Preprocesses query and documents to remove case sensitivity.</a:t>
+            </a:r>
+          </a:p>
+          <a:p>
+            <a:pPr marL="0" indent="0">
+              <a:buNone/>
+            </a:pPr>
+            <a:r>
+              <a:rPr lang="en-US"/>
+              <a:t>• Scores documents based on matching terms.</a:t>
+            </a:r>
+          </a:p>
+          <a:p>
+            <a:pPr marL="0" indent="0">
+              <a:buNone/>
+            </a:pPr>
+            <a:r>
+              <a:rPr lang="en-US"/>
+              <a:t>• Filters out documents with minimal matching terms.</a:t>
             </a:r>
           </a:p>
         </p:txBody>
@@ -4870,7 +4607,7 @@
     </p:spTree>
     <p:extLst>
       <p:ext uri="{BB962C8B-B14F-4D97-AF65-F5344CB8AC3E}">
-        <p14:creationId xmlns:p14="http://schemas.microsoft.com/office/powerpoint/2010/main" val="4281321916"/>
+        <p14:creationId xmlns:p14="http://schemas.microsoft.com/office/powerpoint/2010/main" val="390016025"/>
       </p:ext>
     </p:extLst>
   </p:cSld>
@@ -4902,7 +4639,7 @@
           <p:cNvPr id="2" name="Title 1">
             <a:extLst>
               <a:ext uri="{FF2B5EF4-FFF2-40B4-BE49-F238E27FC236}">
-                <a16:creationId xmlns:a16="http://schemas.microsoft.com/office/drawing/2014/main" id="{DE50E760-660B-9F79-FD5C-4FDAEDA7BCEA}"/>
+                <a16:creationId xmlns:a16="http://schemas.microsoft.com/office/drawing/2014/main" id="{5F0E513B-9411-0B2F-E53C-D866DFD8BFA5}"/>
               </a:ext>
             </a:extLst>
           </p:cNvPr>
@@ -4919,8 +4656,8 @@
           <a:lstStyle/>
           <a:p>
             <a:r>
-              <a:rPr lang="en-US" dirty="0"/>
-              <a:t>Binary Independence Model (BIM)</a:t>
+              <a:rPr lang="en-US"/>
+              <a:t>Non-Overlapped List Model</a:t>
             </a:r>
           </a:p>
         </p:txBody>
@@ -4930,7 +4667,7 @@
           <p:cNvPr id="3" name="Text Placeholder 2">
             <a:extLst>
               <a:ext uri="{FF2B5EF4-FFF2-40B4-BE49-F238E27FC236}">
-                <a16:creationId xmlns:a16="http://schemas.microsoft.com/office/drawing/2014/main" id="{B1061293-4CA9-6679-3003-F44BD2F03393}"/>
+                <a16:creationId xmlns:a16="http://schemas.microsoft.com/office/drawing/2014/main" id="{AA709578-FE6D-727C-AD8F-E484DE8B80A3}"/>
               </a:ext>
             </a:extLst>
           </p:cNvPr>
@@ -4946,29 +4683,30 @@
           <a:bodyPr/>
           <a:lstStyle/>
           <a:p>
-            <a:r>
-              <a:rPr lang="en-US" dirty="0"/>
-              <a:t>The Binary Independence Model (BIM) in computing and information science is a probabilistic information retrieval technique.</a:t>
-            </a:r>
-          </a:p>
-          <a:p>
-            <a:r>
-              <a:rPr lang="en-US" dirty="0"/>
-              <a:t>The Binary Independence Model (BIM) in information retrieval is a straightforward approach: </a:t>
-            </a:r>
-          </a:p>
-          <a:p>
-            <a:pPr lvl="1"/>
-            <a:r>
-              <a:rPr lang="en-US" dirty="0"/>
-              <a:t>Binary Terms: BIM treats each word or term in a document or query as either present (1) or absent (0). It doesn't consider how many times a word appears; it just cares if it's there or not. </a:t>
-            </a:r>
-          </a:p>
-          <a:p>
-            <a:pPr lvl="1"/>
-            <a:r>
-              <a:rPr lang="en-US" dirty="0"/>
-              <a:t>Matching: When you search for something, BIM checks which words in your query are present in each document. It marks them as 1 if they are there, and 0 if they are not.</a:t>
+            <a:pPr marL="0" indent="0">
+              <a:buNone/>
+            </a:pPr>
+            <a:r>
+              <a:rPr lang="en-US"/>
+              <a:t>• Splits the query into individual terms.</a:t>
+            </a:r>
+          </a:p>
+          <a:p>
+            <a:pPr marL="0" indent="0">
+              <a:buNone/>
+            </a:pPr>
+            <a:r>
+              <a:rPr lang="en-US"/>
+              <a:t>• Identifies documents containing each term.</a:t>
+            </a:r>
+          </a:p>
+          <a:p>
+            <a:pPr marL="0" indent="0">
+              <a:buNone/>
+            </a:pPr>
+            <a:r>
+              <a:rPr lang="en-US"/>
+              <a:t>• Returns a mapping of query terms to document IDs.</a:t>
             </a:r>
           </a:p>
         </p:txBody>
@@ -4976,7 +4714,7 @@
     </p:spTree>
     <p:extLst>
       <p:ext uri="{BB962C8B-B14F-4D97-AF65-F5344CB8AC3E}">
-        <p14:creationId xmlns:p14="http://schemas.microsoft.com/office/powerpoint/2010/main" val="1424646067"/>
+        <p14:creationId xmlns:p14="http://schemas.microsoft.com/office/powerpoint/2010/main" val="3728002169"/>
       </p:ext>
     </p:extLst>
   </p:cSld>
@@ -4991,13 +4729,7 @@
   <p:cSld>
     <p:spTree>
       <p:nvGrpSpPr>
-        <p:cNvPr id="1" name="">
-          <a:extLst>
-            <a:ext uri="{FF2B5EF4-FFF2-40B4-BE49-F238E27FC236}">
-              <a16:creationId xmlns:a16="http://schemas.microsoft.com/office/drawing/2014/main" id="{24C5A13E-075E-04D4-50F8-ADEF118BA202}"/>
-            </a:ext>
-          </a:extLst>
-        </p:cNvPr>
+        <p:cNvPr id="1" name=""/>
         <p:cNvGrpSpPr/>
         <p:nvPr/>
       </p:nvGrpSpPr>
@@ -5014,7 +4746,7 @@
           <p:cNvPr id="2" name="Title 1">
             <a:extLst>
               <a:ext uri="{FF2B5EF4-FFF2-40B4-BE49-F238E27FC236}">
-                <a16:creationId xmlns:a16="http://schemas.microsoft.com/office/drawing/2014/main" id="{1377E395-CD4C-B502-BEF3-C3858D110C01}"/>
+                <a16:creationId xmlns:a16="http://schemas.microsoft.com/office/drawing/2014/main" id="{07980158-39C1-6677-CF35-7AE93A202215}"/>
               </a:ext>
             </a:extLst>
           </p:cNvPr>
@@ -5031,8 +4763,8 @@
           <a:lstStyle/>
           <a:p>
             <a:r>
-              <a:rPr lang="en-US" dirty="0"/>
-              <a:t>Binary Independence Model (BIM) - Working</a:t>
+              <a:rPr lang="en-US"/>
+              <a:t>Proximal Nodes Model</a:t>
             </a:r>
           </a:p>
         </p:txBody>
@@ -5042,7 +4774,7 @@
           <p:cNvPr id="3" name="Text Placeholder 2">
             <a:extLst>
               <a:ext uri="{FF2B5EF4-FFF2-40B4-BE49-F238E27FC236}">
-                <a16:creationId xmlns:a16="http://schemas.microsoft.com/office/drawing/2014/main" id="{007FA8FE-7155-E235-BE7A-BA0EF913845F}"/>
+                <a16:creationId xmlns:a16="http://schemas.microsoft.com/office/drawing/2014/main" id="{7FF05274-351D-B4E6-566B-D6501E6A3570}"/>
               </a:ext>
             </a:extLst>
           </p:cNvPr>
@@ -5058,21 +4790,30 @@
           <a:bodyPr/>
           <a:lstStyle/>
           <a:p>
-            <a:r>
-              <a:rPr lang="en-US" dirty="0"/>
-              <a:t>Documents and query terms are binary vectors (1 or 0).</a:t>
-            </a:r>
-          </a:p>
-          <a:p>
-            <a:r>
-              <a:rPr lang="en-US" dirty="0"/>
-              <a:t>Calculate similarity using a scoring function.</a:t>
-            </a:r>
-          </a:p>
-          <a:p>
-            <a:r>
-              <a:rPr lang="en-US" dirty="0"/>
-              <a:t>Rank documents based on matching terms.</a:t>
+            <a:pPr marL="0" indent="0">
+              <a:buNone/>
+            </a:pPr>
+            <a:r>
+              <a:rPr lang="en-US"/>
+              <a:t>• Uses a graph structure to find semantically related terms.</a:t>
+            </a:r>
+          </a:p>
+          <a:p>
+            <a:pPr marL="0" indent="0">
+              <a:buNone/>
+            </a:pPr>
+            <a:r>
+              <a:rPr lang="en-US"/>
+              <a:t>• Matches documents based on the query or related terms.</a:t>
+            </a:r>
+          </a:p>
+          <a:p>
+            <a:pPr marL="0" indent="0">
+              <a:buNone/>
+            </a:pPr>
+            <a:r>
+              <a:rPr lang="en-US"/>
+              <a:t>• Enhances search by considering semantic proximity.</a:t>
             </a:r>
           </a:p>
         </p:txBody>
@@ -5080,7 +4821,7 @@
     </p:spTree>
     <p:extLst>
       <p:ext uri="{BB962C8B-B14F-4D97-AF65-F5344CB8AC3E}">
-        <p14:creationId xmlns:p14="http://schemas.microsoft.com/office/powerpoint/2010/main" val="1828641739"/>
+        <p14:creationId xmlns:p14="http://schemas.microsoft.com/office/powerpoint/2010/main" val="3319311650"/>
       </p:ext>
     </p:extLst>
   </p:cSld>
@@ -5112,7 +4853,7 @@
           <p:cNvPr id="2" name="Title 1">
             <a:extLst>
               <a:ext uri="{FF2B5EF4-FFF2-40B4-BE49-F238E27FC236}">
-                <a16:creationId xmlns:a16="http://schemas.microsoft.com/office/drawing/2014/main" id="{05FA7DFB-83B8-9385-577B-BADFA3D0903D}"/>
+                <a16:creationId xmlns:a16="http://schemas.microsoft.com/office/drawing/2014/main" id="{E8F6396C-B2AB-F16F-7EBA-B9F786219750}"/>
               </a:ext>
             </a:extLst>
           </p:cNvPr>
@@ -5129,48 +4870,66 @@
           <a:lstStyle/>
           <a:p>
             <a:r>
+              <a:rPr lang="en-US"/>
+              <a:t>Search Results</a:t>
+            </a:r>
+          </a:p>
+        </p:txBody>
+      </p:sp>
+      <p:sp>
+        <p:nvSpPr>
+          <p:cNvPr id="3" name="Text Placeholder 2">
+            <a:extLst>
+              <a:ext uri="{FF2B5EF4-FFF2-40B4-BE49-F238E27FC236}">
+                <a16:creationId xmlns:a16="http://schemas.microsoft.com/office/drawing/2014/main" id="{30CFB48A-A66B-6A2B-18EB-3572CD200038}"/>
+              </a:ext>
+            </a:extLst>
+          </p:cNvPr>
+          <p:cNvSpPr>
+            <a:spLocks noGrp="1"/>
+          </p:cNvSpPr>
+          <p:nvPr>
+            <p:ph type="body" idx="1"/>
+          </p:nvPr>
+        </p:nvSpPr>
+        <p:spPr/>
+        <p:txBody>
+          <a:bodyPr/>
+          <a:lstStyle/>
+          <a:p>
+            <a:pPr marL="0" indent="0">
+              <a:buNone/>
+            </a:pPr>
+            <a:r>
               <a:rPr lang="en-US" dirty="0"/>
-              <a:t>Non-Overlapped List Model</a:t>
-            </a:r>
-          </a:p>
-        </p:txBody>
-      </p:sp>
-      <p:sp>
-        <p:nvSpPr>
-          <p:cNvPr id="3" name="Text Placeholder 2">
-            <a:extLst>
-              <a:ext uri="{FF2B5EF4-FFF2-40B4-BE49-F238E27FC236}">
-                <a16:creationId xmlns:a16="http://schemas.microsoft.com/office/drawing/2014/main" id="{6B4DA35E-C429-60B7-1554-45F27E442EB8}"/>
-              </a:ext>
-            </a:extLst>
-          </p:cNvPr>
-          <p:cNvSpPr>
-            <a:spLocks noGrp="1"/>
-          </p:cNvSpPr>
-          <p:nvPr>
-            <p:ph type="body" idx="1"/>
-          </p:nvPr>
-        </p:nvSpPr>
-        <p:spPr/>
-        <p:txBody>
-          <a:bodyPr/>
-          <a:lstStyle/>
-          <a:p>
+              <a:t>• Results are ranked by relevance based on the selected model.</a:t>
+            </a:r>
+          </a:p>
+          <a:p>
+            <a:pPr marL="0" indent="0">
+              <a:buNone/>
+            </a:pPr>
             <a:r>
               <a:rPr lang="en-US" dirty="0"/>
-              <a:t>Identify documents for each query term.</a:t>
-            </a:r>
-          </a:p>
-          <a:p>
+              <a:t>• BIM: Ranked by overlap score.</a:t>
+            </a:r>
+          </a:p>
+          <a:p>
+            <a:pPr marL="0" indent="0">
+              <a:buNone/>
+            </a:pPr>
             <a:r>
               <a:rPr lang="en-US" dirty="0"/>
-              <a:t>Combine results from all terms.</a:t>
-            </a:r>
-          </a:p>
-          <a:p>
+              <a:t>• Non-Overlapped List: Mapped by term.</a:t>
+            </a:r>
+          </a:p>
+          <a:p>
+            <a:pPr marL="0" indent="0">
+              <a:buNone/>
+            </a:pPr>
             <a:r>
               <a:rPr lang="en-US" dirty="0"/>
-              <a:t>Present documents with or without overlapping content.</a:t>
+              <a:t>• Proximal Nodes: Grouped by related terms.</a:t>
             </a:r>
           </a:p>
         </p:txBody>
@@ -5178,7 +4937,7 @@
     </p:spTree>
     <p:extLst>
       <p:ext uri="{BB962C8B-B14F-4D97-AF65-F5344CB8AC3E}">
-        <p14:creationId xmlns:p14="http://schemas.microsoft.com/office/powerpoint/2010/main" val="2754999513"/>
+        <p14:creationId xmlns:p14="http://schemas.microsoft.com/office/powerpoint/2010/main" val="2832162831"/>
       </p:ext>
     </p:extLst>
   </p:cSld>
@@ -5196,7 +4955,7 @@
         <p:cNvPr id="1" name="">
           <a:extLst>
             <a:ext uri="{FF2B5EF4-FFF2-40B4-BE49-F238E27FC236}">
-              <a16:creationId xmlns:a16="http://schemas.microsoft.com/office/drawing/2014/main" id="{C6443596-8293-DEB1-7416-E6FF166A6506}"/>
+              <a16:creationId xmlns:a16="http://schemas.microsoft.com/office/drawing/2014/main" id="{D3F39935-F464-70B6-4625-8A557EE396F7}"/>
             </a:ext>
           </a:extLst>
         </p:cNvPr>
@@ -5216,7 +4975,7 @@
           <p:cNvPr id="2" name="Title 1">
             <a:extLst>
               <a:ext uri="{FF2B5EF4-FFF2-40B4-BE49-F238E27FC236}">
-                <a16:creationId xmlns:a16="http://schemas.microsoft.com/office/drawing/2014/main" id="{CFC8B3F8-4508-A3E2-EBA2-89FA7DF11D7C}"/>
+                <a16:creationId xmlns:a16="http://schemas.microsoft.com/office/drawing/2014/main" id="{94141599-6F61-1AF5-A9EE-06CF9A369D52}"/>
               </a:ext>
             </a:extLst>
           </p:cNvPr>
@@ -5234,93 +4993,50 @@
           <a:p>
             <a:r>
               <a:rPr lang="en-US" dirty="0"/>
-              <a:t>Non-Overlapped List Model - Working</a:t>
-            </a:r>
-          </a:p>
-        </p:txBody>
-      </p:sp>
-      <p:sp>
-        <p:nvSpPr>
-          <p:cNvPr id="3" name="Text Placeholder 2">
-            <a:extLst>
-              <a:ext uri="{FF2B5EF4-FFF2-40B4-BE49-F238E27FC236}">
-                <a16:creationId xmlns:a16="http://schemas.microsoft.com/office/drawing/2014/main" id="{6E9F4DA2-9AE8-4B6A-88E3-288D48373CAC}"/>
-              </a:ext>
-            </a:extLst>
-          </p:cNvPr>
-          <p:cNvSpPr>
-            <a:spLocks noGrp="1"/>
-          </p:cNvSpPr>
-          <p:nvPr>
-            <p:ph type="body" idx="1"/>
-          </p:nvPr>
-        </p:nvSpPr>
-        <p:spPr/>
-        <p:txBody>
-          <a:bodyPr>
-            <a:normAutofit/>
-          </a:bodyPr>
-          <a:lstStyle/>
-          <a:p>
-            <a:pPr marL="228600" indent="-228600" algn="l" rtl="0" eaLnBrk="1" latinLnBrk="0" hangingPunct="1">
-              <a:lnSpc>
-                <a:spcPct val="90000"/>
-              </a:lnSpc>
-              <a:spcBef>
-                <a:spcPts val="1000"/>
-              </a:spcBef>
-              <a:buClrTx/>
-              <a:buSzPts val="2800"/>
-              <a:buFont typeface="Arial" panose="020B0604020202020204" pitchFamily="34" charset="0"/>
-              <a:buChar char="•"/>
-            </a:pPr>
-            <a:r>
-              <a:rPr lang="en-US" kern="1200" dirty="0">
-                <a:solidFill>
-                  <a:srgbClr val="000000"/>
-                </a:solidFill>
-                <a:effectLst/>
-                <a:latin typeface="Aptos" panose="020B0004020202020204" pitchFamily="34" charset="0"/>
-                <a:ea typeface="+mn-ea"/>
-                <a:cs typeface="+mn-cs"/>
-              </a:rPr>
-              <a:t>Divide the whole text of each document in non-overlapping text regions which are collected in a list. </a:t>
-            </a:r>
-            <a:endParaRPr lang="en-US" dirty="0">
-              <a:effectLst/>
-            </a:endParaRPr>
-          </a:p>
-          <a:p>
-            <a:pPr marL="228600" indent="-228600" algn="l" rtl="0" eaLnBrk="1" latinLnBrk="0" hangingPunct="1">
-              <a:lnSpc>
-                <a:spcPct val="90000"/>
-              </a:lnSpc>
-              <a:spcBef>
-                <a:spcPts val="1000"/>
-              </a:spcBef>
-            </a:pPr>
-            <a:r>
-              <a:rPr lang="en-US" kern="1200" dirty="0">
-                <a:solidFill>
-                  <a:srgbClr val="000000"/>
-                </a:solidFill>
-                <a:effectLst/>
-                <a:latin typeface="Aptos" panose="020B0004020202020204" pitchFamily="34" charset="0"/>
-                <a:ea typeface="+mn-ea"/>
-                <a:cs typeface="+mn-cs"/>
-              </a:rPr>
-              <a:t>Text regions in the same list have no overlapping, but text regions from distinct lists might overlap.</a:t>
-            </a:r>
-            <a:endParaRPr lang="en-US" sz="4000" dirty="0">
-              <a:effectLst/>
-            </a:endParaRPr>
-          </a:p>
-        </p:txBody>
-      </p:sp>
+              <a:t>DFD</a:t>
+            </a:r>
+          </a:p>
+        </p:txBody>
+      </p:sp>
+      <p:pic>
+        <p:nvPicPr>
+          <p:cNvPr id="7" name="Picture 6" descr="A diagram of a document&#10;&#10;Description automatically generated">
+            <a:extLst>
+              <a:ext uri="{FF2B5EF4-FFF2-40B4-BE49-F238E27FC236}">
+                <a16:creationId xmlns:a16="http://schemas.microsoft.com/office/drawing/2014/main" id="{D7339C61-7ABB-9581-5ED4-D1A30384643E}"/>
+              </a:ext>
+            </a:extLst>
+          </p:cNvPr>
+          <p:cNvPicPr>
+            <a:picLocks noChangeAspect="1"/>
+          </p:cNvPicPr>
+          <p:nvPr/>
+        </p:nvPicPr>
+        <p:blipFill>
+          <a:blip r:embed="rId2">
+            <a:extLst>
+              <a:ext uri="{28A0092B-C50C-407E-A947-70E740481C1C}">
+                <a14:useLocalDpi xmlns:a14="http://schemas.microsoft.com/office/drawing/2010/main" val="0"/>
+              </a:ext>
+            </a:extLst>
+          </a:blip>
+          <a:srcRect l="21822" t="17122"/>
+          <a:stretch/>
+        </p:blipFill>
+        <p:spPr>
+          <a:xfrm>
+            <a:off x="1992430" y="1174282"/>
+            <a:ext cx="7806743" cy="5683718"/>
+          </a:xfrm>
+          <a:prstGeom prst="rect">
+            <a:avLst/>
+          </a:prstGeom>
+        </p:spPr>
+      </p:pic>
     </p:spTree>
     <p:extLst>
       <p:ext uri="{BB962C8B-B14F-4D97-AF65-F5344CB8AC3E}">
-        <p14:creationId xmlns:p14="http://schemas.microsoft.com/office/powerpoint/2010/main" val="3734458409"/>
+        <p14:creationId xmlns:p14="http://schemas.microsoft.com/office/powerpoint/2010/main" val="975042510"/>
       </p:ext>
     </p:extLst>
   </p:cSld>

</xml_diff>